<commit_message>
updated figs and ms
</commit_message>
<xml_diff>
--- a/Figs/Fig 3.pptx
+++ b/Figs/Fig 3.pptx
@@ -2,15 +2,15 @@
 <file path=ppt/presentation.xml><?xml version="1.0" encoding="utf-8"?>
 <p:presentation xmlns:a="http://schemas.openxmlformats.org/drawingml/2006/main" xmlns:r="http://schemas.openxmlformats.org/officeDocument/2006/relationships" xmlns:p="http://schemas.openxmlformats.org/presentationml/2006/main" saveSubsetFonts="1" autoCompressPictures="0">
   <p:sldMasterIdLst>
-    <p:sldMasterId id="2147483672" r:id="rId1"/>
+    <p:sldMasterId id="2147483708" r:id="rId1"/>
   </p:sldMasterIdLst>
   <p:notesMasterIdLst>
     <p:notesMasterId r:id="rId3"/>
   </p:notesMasterIdLst>
   <p:sldIdLst>
-    <p:sldId id="256" r:id="rId2"/>
+    <p:sldId id="257" r:id="rId2"/>
   </p:sldIdLst>
-  <p:sldSz cx="12192000" cy="6480175"/>
+  <p:sldSz cx="12192000" cy="12420600"/>
   <p:notesSz cx="6858000" cy="9144000"/>
   <p:defaultTextStyle>
     <a:defPPr>
@@ -107,6 +107,11 @@
       </a:defRPr>
     </a:lvl9pPr>
   </p:defaultTextStyle>
+  <p:extLst>
+    <p:ext uri="{EFAFB233-063F-42B5-8137-9DF3F51BA10A}">
+      <p15:sldGuideLst xmlns:p15="http://schemas.microsoft.com/office/powerpoint/2012/main"/>
+    </p:ext>
+  </p:extLst>
 </p:presentation>
 </file>
 
@@ -192,7 +197,7 @@
           <a:p>
             <a:fld id="{5B90AFD6-D414-914E-91D9-BE399BF7E284}" type="datetimeFigureOut">
               <a:rPr lang="en-GB" smtClean="0"/>
-              <a:t>15/11/2022</a:t>
+              <a:t>11/12/2022</a:t>
             </a:fld>
             <a:endParaRPr lang="en-GB"/>
           </a:p>
@@ -210,8 +215,8 @@
         </p:nvSpPr>
         <p:spPr>
           <a:xfrm>
-            <a:off x="525463" y="1143000"/>
-            <a:ext cx="5807075" cy="3086100"/>
+            <a:off x="1914525" y="1143000"/>
+            <a:ext cx="3028950" cy="3086100"/>
           </a:xfrm>
           <a:prstGeom prst="rect">
             <a:avLst/>
@@ -488,8 +493,8 @@
         </p:nvSpPr>
         <p:spPr>
           <a:xfrm>
-            <a:off x="525463" y="1143000"/>
-            <a:ext cx="5807075" cy="3086100"/>
+            <a:off x="1914525" y="1143000"/>
+            <a:ext cx="3028950" cy="3086100"/>
           </a:xfrm>
         </p:spPr>
       </p:sp>
@@ -538,7 +543,7 @@
     </p:spTree>
     <p:extLst>
       <p:ext uri="{BB962C8B-B14F-4D97-AF65-F5344CB8AC3E}">
-        <p14:creationId xmlns:p14="http://schemas.microsoft.com/office/powerpoint/2010/main" val="764733747"/>
+        <p14:creationId xmlns:p14="http://schemas.microsoft.com/office/powerpoint/2010/main" val="3631810786"/>
       </p:ext>
     </p:extLst>
   </p:cSld>
@@ -577,20 +582,20 @@
         </p:nvSpPr>
         <p:spPr>
           <a:xfrm>
-            <a:off x="1524000" y="1060529"/>
-            <a:ext cx="9144000" cy="2256061"/>
+            <a:off x="914400" y="2032724"/>
+            <a:ext cx="10363200" cy="4324209"/>
           </a:xfrm>
         </p:spPr>
         <p:txBody>
           <a:bodyPr anchor="b"/>
           <a:lstStyle>
             <a:lvl1pPr algn="ctr">
-              <a:defRPr sz="5669"/>
+              <a:defRPr sz="8000"/>
             </a:lvl1pPr>
           </a:lstStyle>
           <a:p>
             <a:r>
-              <a:rPr lang="en-GB"/>
+              <a:rPr lang="en-US"/>
               <a:t>Click to edit Master title style</a:t>
             </a:r>
             <a:endParaRPr lang="en-US" dirty="0"/>
@@ -609,8 +614,8 @@
         </p:nvSpPr>
         <p:spPr>
           <a:xfrm>
-            <a:off x="1524000" y="3403592"/>
-            <a:ext cx="9144000" cy="1564542"/>
+            <a:off x="1524000" y="6523691"/>
+            <a:ext cx="9144000" cy="2998769"/>
           </a:xfrm>
         </p:spPr>
         <p:txBody>
@@ -618,44 +623,44 @@
           <a:lstStyle>
             <a:lvl1pPr marL="0" indent="0" algn="ctr">
               <a:buNone/>
-              <a:defRPr sz="2268"/>
+              <a:defRPr sz="3200"/>
             </a:lvl1pPr>
-            <a:lvl2pPr marL="432008" indent="0" algn="ctr">
-              <a:buNone/>
-              <a:defRPr sz="1890"/>
+            <a:lvl2pPr marL="609585" indent="0" algn="ctr">
+              <a:buNone/>
+              <a:defRPr sz="2667"/>
             </a:lvl2pPr>
-            <a:lvl3pPr marL="864017" indent="0" algn="ctr">
-              <a:buNone/>
-              <a:defRPr sz="1701"/>
+            <a:lvl3pPr marL="1219170" indent="0" algn="ctr">
+              <a:buNone/>
+              <a:defRPr sz="2400"/>
             </a:lvl3pPr>
-            <a:lvl4pPr marL="1296025" indent="0" algn="ctr">
-              <a:buNone/>
-              <a:defRPr sz="1512"/>
+            <a:lvl4pPr marL="1828754" indent="0" algn="ctr">
+              <a:buNone/>
+              <a:defRPr sz="2133"/>
             </a:lvl4pPr>
-            <a:lvl5pPr marL="1728033" indent="0" algn="ctr">
-              <a:buNone/>
-              <a:defRPr sz="1512"/>
+            <a:lvl5pPr marL="2438339" indent="0" algn="ctr">
+              <a:buNone/>
+              <a:defRPr sz="2133"/>
             </a:lvl5pPr>
-            <a:lvl6pPr marL="2160041" indent="0" algn="ctr">
-              <a:buNone/>
-              <a:defRPr sz="1512"/>
+            <a:lvl6pPr marL="3047924" indent="0" algn="ctr">
+              <a:buNone/>
+              <a:defRPr sz="2133"/>
             </a:lvl6pPr>
-            <a:lvl7pPr marL="2592050" indent="0" algn="ctr">
-              <a:buNone/>
-              <a:defRPr sz="1512"/>
+            <a:lvl7pPr marL="3657509" indent="0" algn="ctr">
+              <a:buNone/>
+              <a:defRPr sz="2133"/>
             </a:lvl7pPr>
-            <a:lvl8pPr marL="3024058" indent="0" algn="ctr">
-              <a:buNone/>
-              <a:defRPr sz="1512"/>
+            <a:lvl8pPr marL="4267093" indent="0" algn="ctr">
+              <a:buNone/>
+              <a:defRPr sz="2133"/>
             </a:lvl8pPr>
-            <a:lvl9pPr marL="3456066" indent="0" algn="ctr">
-              <a:buNone/>
-              <a:defRPr sz="1512"/>
+            <a:lvl9pPr marL="4876678" indent="0" algn="ctr">
+              <a:buNone/>
+              <a:defRPr sz="2133"/>
             </a:lvl9pPr>
           </a:lstStyle>
           <a:p>
             <a:r>
-              <a:rPr lang="en-GB"/>
+              <a:rPr lang="en-US"/>
               <a:t>Click to edit Master subtitle style</a:t>
             </a:r>
             <a:endParaRPr lang="en-US" dirty="0"/>
@@ -679,7 +684,7 @@
           <a:p>
             <a:fld id="{D6E15244-DF10-C54C-80B4-2BA48BDAEEC4}" type="datetimeFigureOut">
               <a:rPr lang="en-GB" smtClean="0"/>
-              <a:t>15/11/2022</a:t>
+              <a:t>11/12/2022</a:t>
             </a:fld>
             <a:endParaRPr lang="en-GB"/>
           </a:p>
@@ -730,7 +735,7 @@
     </p:spTree>
     <p:extLst>
       <p:ext uri="{BB962C8B-B14F-4D97-AF65-F5344CB8AC3E}">
-        <p14:creationId xmlns:p14="http://schemas.microsoft.com/office/powerpoint/2010/main" val="2491313787"/>
+        <p14:creationId xmlns:p14="http://schemas.microsoft.com/office/powerpoint/2010/main" val="245333057"/>
       </p:ext>
     </p:extLst>
   </p:cSld>
@@ -773,7 +778,7 @@
           <a:lstStyle/>
           <a:p>
             <a:r>
-              <a:rPr lang="en-GB"/>
+              <a:rPr lang="en-US"/>
               <a:t>Click to edit Master title style</a:t>
             </a:r>
             <a:endParaRPr lang="en-US" dirty="0"/>
@@ -797,35 +802,35 @@
           <a:p>
             <a:pPr lvl="0"/>
             <a:r>
-              <a:rPr lang="en-GB"/>
+              <a:rPr lang="en-US"/>
               <a:t>Click to edit Master text styles</a:t>
             </a:r>
           </a:p>
           <a:p>
             <a:pPr lvl="1"/>
             <a:r>
-              <a:rPr lang="en-GB"/>
+              <a:rPr lang="en-US"/>
               <a:t>Second level</a:t>
             </a:r>
           </a:p>
           <a:p>
             <a:pPr lvl="2"/>
             <a:r>
-              <a:rPr lang="en-GB"/>
+              <a:rPr lang="en-US"/>
               <a:t>Third level</a:t>
             </a:r>
           </a:p>
           <a:p>
             <a:pPr lvl="3"/>
             <a:r>
-              <a:rPr lang="en-GB"/>
+              <a:rPr lang="en-US"/>
               <a:t>Fourth level</a:t>
             </a:r>
           </a:p>
           <a:p>
             <a:pPr lvl="4"/>
             <a:r>
-              <a:rPr lang="en-GB"/>
+              <a:rPr lang="en-US"/>
               <a:t>Fifth level</a:t>
             </a:r>
             <a:endParaRPr lang="en-US" dirty="0"/>
@@ -849,7 +854,7 @@
           <a:p>
             <a:fld id="{D6E15244-DF10-C54C-80B4-2BA48BDAEEC4}" type="datetimeFigureOut">
               <a:rPr lang="en-GB" smtClean="0"/>
-              <a:t>15/11/2022</a:t>
+              <a:t>11/12/2022</a:t>
             </a:fld>
             <a:endParaRPr lang="en-GB"/>
           </a:p>
@@ -900,7 +905,7 @@
     </p:spTree>
     <p:extLst>
       <p:ext uri="{BB962C8B-B14F-4D97-AF65-F5344CB8AC3E}">
-        <p14:creationId xmlns:p14="http://schemas.microsoft.com/office/powerpoint/2010/main" val="1388583872"/>
+        <p14:creationId xmlns:p14="http://schemas.microsoft.com/office/powerpoint/2010/main" val="3159011729"/>
       </p:ext>
     </p:extLst>
   </p:cSld>
@@ -939,8 +944,8 @@
         </p:nvSpPr>
         <p:spPr>
           <a:xfrm>
-            <a:off x="8724900" y="345009"/>
-            <a:ext cx="2628900" cy="5491649"/>
+            <a:off x="8724901" y="661282"/>
+            <a:ext cx="2628900" cy="10525884"/>
           </a:xfrm>
         </p:spPr>
         <p:txBody>
@@ -948,7 +953,7 @@
           <a:lstStyle/>
           <a:p>
             <a:r>
-              <a:rPr lang="en-GB"/>
+              <a:rPr lang="en-US"/>
               <a:t>Click to edit Master title style</a:t>
             </a:r>
             <a:endParaRPr lang="en-US" dirty="0"/>
@@ -967,8 +972,8 @@
         </p:nvSpPr>
         <p:spPr>
           <a:xfrm>
-            <a:off x="838200" y="345009"/>
-            <a:ext cx="7734300" cy="5491649"/>
+            <a:off x="838201" y="661282"/>
+            <a:ext cx="7734300" cy="10525884"/>
           </a:xfrm>
         </p:spPr>
         <p:txBody>
@@ -977,35 +982,35 @@
           <a:p>
             <a:pPr lvl="0"/>
             <a:r>
-              <a:rPr lang="en-GB"/>
+              <a:rPr lang="en-US"/>
               <a:t>Click to edit Master text styles</a:t>
             </a:r>
           </a:p>
           <a:p>
             <a:pPr lvl="1"/>
             <a:r>
-              <a:rPr lang="en-GB"/>
+              <a:rPr lang="en-US"/>
               <a:t>Second level</a:t>
             </a:r>
           </a:p>
           <a:p>
             <a:pPr lvl="2"/>
             <a:r>
-              <a:rPr lang="en-GB"/>
+              <a:rPr lang="en-US"/>
               <a:t>Third level</a:t>
             </a:r>
           </a:p>
           <a:p>
             <a:pPr lvl="3"/>
             <a:r>
-              <a:rPr lang="en-GB"/>
+              <a:rPr lang="en-US"/>
               <a:t>Fourth level</a:t>
             </a:r>
           </a:p>
           <a:p>
             <a:pPr lvl="4"/>
             <a:r>
-              <a:rPr lang="en-GB"/>
+              <a:rPr lang="en-US"/>
               <a:t>Fifth level</a:t>
             </a:r>
             <a:endParaRPr lang="en-US" dirty="0"/>
@@ -1029,7 +1034,7 @@
           <a:p>
             <a:fld id="{D6E15244-DF10-C54C-80B4-2BA48BDAEEC4}" type="datetimeFigureOut">
               <a:rPr lang="en-GB" smtClean="0"/>
-              <a:t>15/11/2022</a:t>
+              <a:t>11/12/2022</a:t>
             </a:fld>
             <a:endParaRPr lang="en-GB"/>
           </a:p>
@@ -1080,7 +1085,7 @@
     </p:spTree>
     <p:extLst>
       <p:ext uri="{BB962C8B-B14F-4D97-AF65-F5344CB8AC3E}">
-        <p14:creationId xmlns:p14="http://schemas.microsoft.com/office/powerpoint/2010/main" val="2118663863"/>
+        <p14:creationId xmlns:p14="http://schemas.microsoft.com/office/powerpoint/2010/main" val="2431946128"/>
       </p:ext>
     </p:extLst>
   </p:cSld>
@@ -1123,7 +1128,7 @@
           <a:lstStyle/>
           <a:p>
             <a:r>
-              <a:rPr lang="en-GB"/>
+              <a:rPr lang="en-US"/>
               <a:t>Click to edit Master title style</a:t>
             </a:r>
             <a:endParaRPr lang="en-US" dirty="0"/>
@@ -1147,35 +1152,35 @@
           <a:p>
             <a:pPr lvl="0"/>
             <a:r>
-              <a:rPr lang="en-GB"/>
+              <a:rPr lang="en-US"/>
               <a:t>Click to edit Master text styles</a:t>
             </a:r>
           </a:p>
           <a:p>
             <a:pPr lvl="1"/>
             <a:r>
-              <a:rPr lang="en-GB"/>
+              <a:rPr lang="en-US"/>
               <a:t>Second level</a:t>
             </a:r>
           </a:p>
           <a:p>
             <a:pPr lvl="2"/>
             <a:r>
-              <a:rPr lang="en-GB"/>
+              <a:rPr lang="en-US"/>
               <a:t>Third level</a:t>
             </a:r>
           </a:p>
           <a:p>
             <a:pPr lvl="3"/>
             <a:r>
-              <a:rPr lang="en-GB"/>
+              <a:rPr lang="en-US"/>
               <a:t>Fourth level</a:t>
             </a:r>
           </a:p>
           <a:p>
             <a:pPr lvl="4"/>
             <a:r>
-              <a:rPr lang="en-GB"/>
+              <a:rPr lang="en-US"/>
               <a:t>Fifth level</a:t>
             </a:r>
             <a:endParaRPr lang="en-US" dirty="0"/>
@@ -1199,7 +1204,7 @@
           <a:p>
             <a:fld id="{D6E15244-DF10-C54C-80B4-2BA48BDAEEC4}" type="datetimeFigureOut">
               <a:rPr lang="en-GB" smtClean="0"/>
-              <a:t>15/11/2022</a:t>
+              <a:t>11/12/2022</a:t>
             </a:fld>
             <a:endParaRPr lang="en-GB"/>
           </a:p>
@@ -1250,7 +1255,7 @@
     </p:spTree>
     <p:extLst>
       <p:ext uri="{BB962C8B-B14F-4D97-AF65-F5344CB8AC3E}">
-        <p14:creationId xmlns:p14="http://schemas.microsoft.com/office/powerpoint/2010/main" val="3493681859"/>
+        <p14:creationId xmlns:p14="http://schemas.microsoft.com/office/powerpoint/2010/main" val="3205825795"/>
       </p:ext>
     </p:extLst>
   </p:cSld>
@@ -1289,20 +1294,20 @@
         </p:nvSpPr>
         <p:spPr>
           <a:xfrm>
-            <a:off x="831850" y="1615545"/>
-            <a:ext cx="10515600" cy="2695572"/>
+            <a:off x="831851" y="3096528"/>
+            <a:ext cx="10515600" cy="5166624"/>
           </a:xfrm>
         </p:spPr>
         <p:txBody>
           <a:bodyPr anchor="b"/>
           <a:lstStyle>
             <a:lvl1pPr>
-              <a:defRPr sz="5669"/>
+              <a:defRPr sz="8000"/>
             </a:lvl1pPr>
           </a:lstStyle>
           <a:p>
             <a:r>
-              <a:rPr lang="en-GB"/>
+              <a:rPr lang="en-US"/>
               <a:t>Click to edit Master title style</a:t>
             </a:r>
             <a:endParaRPr lang="en-US" dirty="0"/>
@@ -1321,8 +1326,8 @@
         </p:nvSpPr>
         <p:spPr>
           <a:xfrm>
-            <a:off x="831850" y="4336618"/>
-            <a:ext cx="10515600" cy="1417538"/>
+            <a:off x="831851" y="8312030"/>
+            <a:ext cx="10515600" cy="2717005"/>
           </a:xfrm>
         </p:spPr>
         <p:txBody>
@@ -1330,17 +1335,15 @@
           <a:lstStyle>
             <a:lvl1pPr marL="0" indent="0">
               <a:buNone/>
-              <a:defRPr sz="2268">
+              <a:defRPr sz="3200">
                 <a:solidFill>
-                  <a:schemeClr val="tx1">
-                    <a:tint val="75000"/>
-                  </a:schemeClr>
+                  <a:schemeClr val="tx1"/>
                 </a:solidFill>
               </a:defRPr>
             </a:lvl1pPr>
-            <a:lvl2pPr marL="432008" indent="0">
-              <a:buNone/>
-              <a:defRPr sz="1890">
+            <a:lvl2pPr marL="609585" indent="0">
+              <a:buNone/>
+              <a:defRPr sz="2667">
                 <a:solidFill>
                   <a:schemeClr val="tx1">
                     <a:tint val="75000"/>
@@ -1348,9 +1351,9 @@
                 </a:solidFill>
               </a:defRPr>
             </a:lvl2pPr>
-            <a:lvl3pPr marL="864017" indent="0">
-              <a:buNone/>
-              <a:defRPr sz="1701">
+            <a:lvl3pPr marL="1219170" indent="0">
+              <a:buNone/>
+              <a:defRPr sz="2400">
                 <a:solidFill>
                   <a:schemeClr val="tx1">
                     <a:tint val="75000"/>
@@ -1358,9 +1361,9 @@
                 </a:solidFill>
               </a:defRPr>
             </a:lvl3pPr>
-            <a:lvl4pPr marL="1296025" indent="0">
-              <a:buNone/>
-              <a:defRPr sz="1512">
+            <a:lvl4pPr marL="1828754" indent="0">
+              <a:buNone/>
+              <a:defRPr sz="2133">
                 <a:solidFill>
                   <a:schemeClr val="tx1">
                     <a:tint val="75000"/>
@@ -1368,9 +1371,9 @@
                 </a:solidFill>
               </a:defRPr>
             </a:lvl4pPr>
-            <a:lvl5pPr marL="1728033" indent="0">
-              <a:buNone/>
-              <a:defRPr sz="1512">
+            <a:lvl5pPr marL="2438339" indent="0">
+              <a:buNone/>
+              <a:defRPr sz="2133">
                 <a:solidFill>
                   <a:schemeClr val="tx1">
                     <a:tint val="75000"/>
@@ -1378,9 +1381,9 @@
                 </a:solidFill>
               </a:defRPr>
             </a:lvl5pPr>
-            <a:lvl6pPr marL="2160041" indent="0">
-              <a:buNone/>
-              <a:defRPr sz="1512">
+            <a:lvl6pPr marL="3047924" indent="0">
+              <a:buNone/>
+              <a:defRPr sz="2133">
                 <a:solidFill>
                   <a:schemeClr val="tx1">
                     <a:tint val="75000"/>
@@ -1388,9 +1391,9 @@
                 </a:solidFill>
               </a:defRPr>
             </a:lvl6pPr>
-            <a:lvl7pPr marL="2592050" indent="0">
-              <a:buNone/>
-              <a:defRPr sz="1512">
+            <a:lvl7pPr marL="3657509" indent="0">
+              <a:buNone/>
+              <a:defRPr sz="2133">
                 <a:solidFill>
                   <a:schemeClr val="tx1">
                     <a:tint val="75000"/>
@@ -1398,9 +1401,9 @@
                 </a:solidFill>
               </a:defRPr>
             </a:lvl7pPr>
-            <a:lvl8pPr marL="3024058" indent="0">
-              <a:buNone/>
-              <a:defRPr sz="1512">
+            <a:lvl8pPr marL="4267093" indent="0">
+              <a:buNone/>
+              <a:defRPr sz="2133">
                 <a:solidFill>
                   <a:schemeClr val="tx1">
                     <a:tint val="75000"/>
@@ -1408,9 +1411,9 @@
                 </a:solidFill>
               </a:defRPr>
             </a:lvl8pPr>
-            <a:lvl9pPr marL="3456066" indent="0">
-              <a:buNone/>
-              <a:defRPr sz="1512">
+            <a:lvl9pPr marL="4876678" indent="0">
+              <a:buNone/>
+              <a:defRPr sz="2133">
                 <a:solidFill>
                   <a:schemeClr val="tx1">
                     <a:tint val="75000"/>
@@ -1422,7 +1425,7 @@
           <a:p>
             <a:pPr lvl="0"/>
             <a:r>
-              <a:rPr lang="en-GB"/>
+              <a:rPr lang="en-US"/>
               <a:t>Click to edit Master text styles</a:t>
             </a:r>
           </a:p>
@@ -1445,7 +1448,7 @@
           <a:p>
             <a:fld id="{D6E15244-DF10-C54C-80B4-2BA48BDAEEC4}" type="datetimeFigureOut">
               <a:rPr lang="en-GB" smtClean="0"/>
-              <a:t>15/11/2022</a:t>
+              <a:t>11/12/2022</a:t>
             </a:fld>
             <a:endParaRPr lang="en-GB"/>
           </a:p>
@@ -1496,7 +1499,7 @@
     </p:spTree>
     <p:extLst>
       <p:ext uri="{BB962C8B-B14F-4D97-AF65-F5344CB8AC3E}">
-        <p14:creationId xmlns:p14="http://schemas.microsoft.com/office/powerpoint/2010/main" val="245936107"/>
+        <p14:creationId xmlns:p14="http://schemas.microsoft.com/office/powerpoint/2010/main" val="2422789993"/>
       </p:ext>
     </p:extLst>
   </p:cSld>
@@ -1539,7 +1542,7 @@
           <a:lstStyle/>
           <a:p>
             <a:r>
-              <a:rPr lang="en-GB"/>
+              <a:rPr lang="en-US"/>
               <a:t>Click to edit Master title style</a:t>
             </a:r>
             <a:endParaRPr lang="en-US" dirty="0"/>
@@ -1558,8 +1561,8 @@
         </p:nvSpPr>
         <p:spPr>
           <a:xfrm>
-            <a:off x="838200" y="1725046"/>
-            <a:ext cx="5181600" cy="4111612"/>
+            <a:off x="838200" y="3306410"/>
+            <a:ext cx="5181600" cy="7880757"/>
           </a:xfrm>
         </p:spPr>
         <p:txBody>
@@ -1568,35 +1571,35 @@
           <a:p>
             <a:pPr lvl="0"/>
             <a:r>
-              <a:rPr lang="en-GB"/>
+              <a:rPr lang="en-US"/>
               <a:t>Click to edit Master text styles</a:t>
             </a:r>
           </a:p>
           <a:p>
             <a:pPr lvl="1"/>
             <a:r>
-              <a:rPr lang="en-GB"/>
+              <a:rPr lang="en-US"/>
               <a:t>Second level</a:t>
             </a:r>
           </a:p>
           <a:p>
             <a:pPr lvl="2"/>
             <a:r>
-              <a:rPr lang="en-GB"/>
+              <a:rPr lang="en-US"/>
               <a:t>Third level</a:t>
             </a:r>
           </a:p>
           <a:p>
             <a:pPr lvl="3"/>
             <a:r>
-              <a:rPr lang="en-GB"/>
+              <a:rPr lang="en-US"/>
               <a:t>Fourth level</a:t>
             </a:r>
           </a:p>
           <a:p>
             <a:pPr lvl="4"/>
             <a:r>
-              <a:rPr lang="en-GB"/>
+              <a:rPr lang="en-US"/>
               <a:t>Fifth level</a:t>
             </a:r>
             <a:endParaRPr lang="en-US" dirty="0"/>
@@ -1615,8 +1618,8 @@
         </p:nvSpPr>
         <p:spPr>
           <a:xfrm>
-            <a:off x="6172200" y="1725046"/>
-            <a:ext cx="5181600" cy="4111612"/>
+            <a:off x="6172200" y="3306410"/>
+            <a:ext cx="5181600" cy="7880757"/>
           </a:xfrm>
         </p:spPr>
         <p:txBody>
@@ -1625,35 +1628,35 @@
           <a:p>
             <a:pPr lvl="0"/>
             <a:r>
-              <a:rPr lang="en-GB"/>
+              <a:rPr lang="en-US"/>
               <a:t>Click to edit Master text styles</a:t>
             </a:r>
           </a:p>
           <a:p>
             <a:pPr lvl="1"/>
             <a:r>
-              <a:rPr lang="en-GB"/>
+              <a:rPr lang="en-US"/>
               <a:t>Second level</a:t>
             </a:r>
           </a:p>
           <a:p>
             <a:pPr lvl="2"/>
             <a:r>
-              <a:rPr lang="en-GB"/>
+              <a:rPr lang="en-US"/>
               <a:t>Third level</a:t>
             </a:r>
           </a:p>
           <a:p>
             <a:pPr lvl="3"/>
             <a:r>
-              <a:rPr lang="en-GB"/>
+              <a:rPr lang="en-US"/>
               <a:t>Fourth level</a:t>
             </a:r>
           </a:p>
           <a:p>
             <a:pPr lvl="4"/>
             <a:r>
-              <a:rPr lang="en-GB"/>
+              <a:rPr lang="en-US"/>
               <a:t>Fifth level</a:t>
             </a:r>
             <a:endParaRPr lang="en-US" dirty="0"/>
@@ -1677,7 +1680,7 @@
           <a:p>
             <a:fld id="{D6E15244-DF10-C54C-80B4-2BA48BDAEEC4}" type="datetimeFigureOut">
               <a:rPr lang="en-GB" smtClean="0"/>
-              <a:t>15/11/2022</a:t>
+              <a:t>11/12/2022</a:t>
             </a:fld>
             <a:endParaRPr lang="en-GB"/>
           </a:p>
@@ -1728,7 +1731,7 @@
     </p:spTree>
     <p:extLst>
       <p:ext uri="{BB962C8B-B14F-4D97-AF65-F5344CB8AC3E}">
-        <p14:creationId xmlns:p14="http://schemas.microsoft.com/office/powerpoint/2010/main" val="2386244182"/>
+        <p14:creationId xmlns:p14="http://schemas.microsoft.com/office/powerpoint/2010/main" val="3109923864"/>
       </p:ext>
     </p:extLst>
   </p:cSld>
@@ -1767,8 +1770,8 @@
         </p:nvSpPr>
         <p:spPr>
           <a:xfrm>
-            <a:off x="839788" y="345010"/>
-            <a:ext cx="10515600" cy="1252534"/>
+            <a:off x="839788" y="661285"/>
+            <a:ext cx="10515600" cy="2400742"/>
           </a:xfrm>
         </p:spPr>
         <p:txBody>
@@ -1776,7 +1779,7 @@
           <a:lstStyle/>
           <a:p>
             <a:r>
-              <a:rPr lang="en-GB"/>
+              <a:rPr lang="en-US"/>
               <a:t>Click to edit Master title style</a:t>
             </a:r>
             <a:endParaRPr lang="en-US" dirty="0"/>
@@ -1795,8 +1798,8 @@
         </p:nvSpPr>
         <p:spPr>
           <a:xfrm>
-            <a:off x="839789" y="1588543"/>
-            <a:ext cx="5157787" cy="778521"/>
+            <a:off x="839789" y="3044773"/>
+            <a:ext cx="5157787" cy="1492196"/>
           </a:xfrm>
         </p:spPr>
         <p:txBody>
@@ -1804,45 +1807,45 @@
           <a:lstStyle>
             <a:lvl1pPr marL="0" indent="0">
               <a:buNone/>
-              <a:defRPr sz="2268" b="1"/>
+              <a:defRPr sz="3200" b="1"/>
             </a:lvl1pPr>
-            <a:lvl2pPr marL="432008" indent="0">
-              <a:buNone/>
-              <a:defRPr sz="1890" b="1"/>
+            <a:lvl2pPr marL="609585" indent="0">
+              <a:buNone/>
+              <a:defRPr sz="2667" b="1"/>
             </a:lvl2pPr>
-            <a:lvl3pPr marL="864017" indent="0">
-              <a:buNone/>
-              <a:defRPr sz="1701" b="1"/>
+            <a:lvl3pPr marL="1219170" indent="0">
+              <a:buNone/>
+              <a:defRPr sz="2400" b="1"/>
             </a:lvl3pPr>
-            <a:lvl4pPr marL="1296025" indent="0">
-              <a:buNone/>
-              <a:defRPr sz="1512" b="1"/>
+            <a:lvl4pPr marL="1828754" indent="0">
+              <a:buNone/>
+              <a:defRPr sz="2133" b="1"/>
             </a:lvl4pPr>
-            <a:lvl5pPr marL="1728033" indent="0">
-              <a:buNone/>
-              <a:defRPr sz="1512" b="1"/>
+            <a:lvl5pPr marL="2438339" indent="0">
+              <a:buNone/>
+              <a:defRPr sz="2133" b="1"/>
             </a:lvl5pPr>
-            <a:lvl6pPr marL="2160041" indent="0">
-              <a:buNone/>
-              <a:defRPr sz="1512" b="1"/>
+            <a:lvl6pPr marL="3047924" indent="0">
+              <a:buNone/>
+              <a:defRPr sz="2133" b="1"/>
             </a:lvl6pPr>
-            <a:lvl7pPr marL="2592050" indent="0">
-              <a:buNone/>
-              <a:defRPr sz="1512" b="1"/>
+            <a:lvl7pPr marL="3657509" indent="0">
+              <a:buNone/>
+              <a:defRPr sz="2133" b="1"/>
             </a:lvl7pPr>
-            <a:lvl8pPr marL="3024058" indent="0">
-              <a:buNone/>
-              <a:defRPr sz="1512" b="1"/>
+            <a:lvl8pPr marL="4267093" indent="0">
+              <a:buNone/>
+              <a:defRPr sz="2133" b="1"/>
             </a:lvl8pPr>
-            <a:lvl9pPr marL="3456066" indent="0">
-              <a:buNone/>
-              <a:defRPr sz="1512" b="1"/>
+            <a:lvl9pPr marL="4876678" indent="0">
+              <a:buNone/>
+              <a:defRPr sz="2133" b="1"/>
             </a:lvl9pPr>
           </a:lstStyle>
           <a:p>
             <a:pPr lvl="0"/>
             <a:r>
-              <a:rPr lang="en-GB"/>
+              <a:rPr lang="en-US"/>
               <a:t>Click to edit Master text styles</a:t>
             </a:r>
           </a:p>
@@ -1860,8 +1863,8 @@
         </p:nvSpPr>
         <p:spPr>
           <a:xfrm>
-            <a:off x="839789" y="2367064"/>
-            <a:ext cx="5157787" cy="3481594"/>
+            <a:off x="839789" y="4536969"/>
+            <a:ext cx="5157787" cy="6673198"/>
           </a:xfrm>
         </p:spPr>
         <p:txBody>
@@ -1870,35 +1873,35 @@
           <a:p>
             <a:pPr lvl="0"/>
             <a:r>
-              <a:rPr lang="en-GB"/>
+              <a:rPr lang="en-US"/>
               <a:t>Click to edit Master text styles</a:t>
             </a:r>
           </a:p>
           <a:p>
             <a:pPr lvl="1"/>
             <a:r>
-              <a:rPr lang="en-GB"/>
+              <a:rPr lang="en-US"/>
               <a:t>Second level</a:t>
             </a:r>
           </a:p>
           <a:p>
             <a:pPr lvl="2"/>
             <a:r>
-              <a:rPr lang="en-GB"/>
+              <a:rPr lang="en-US"/>
               <a:t>Third level</a:t>
             </a:r>
           </a:p>
           <a:p>
             <a:pPr lvl="3"/>
             <a:r>
-              <a:rPr lang="en-GB"/>
+              <a:rPr lang="en-US"/>
               <a:t>Fourth level</a:t>
             </a:r>
           </a:p>
           <a:p>
             <a:pPr lvl="4"/>
             <a:r>
-              <a:rPr lang="en-GB"/>
+              <a:rPr lang="en-US"/>
               <a:t>Fifth level</a:t>
             </a:r>
             <a:endParaRPr lang="en-US" dirty="0"/>
@@ -1917,8 +1920,8 @@
         </p:nvSpPr>
         <p:spPr>
           <a:xfrm>
-            <a:off x="6172200" y="1588543"/>
-            <a:ext cx="5183188" cy="778521"/>
+            <a:off x="6172201" y="3044773"/>
+            <a:ext cx="5183188" cy="1492196"/>
           </a:xfrm>
         </p:spPr>
         <p:txBody>
@@ -1926,45 +1929,45 @@
           <a:lstStyle>
             <a:lvl1pPr marL="0" indent="0">
               <a:buNone/>
-              <a:defRPr sz="2268" b="1"/>
+              <a:defRPr sz="3200" b="1"/>
             </a:lvl1pPr>
-            <a:lvl2pPr marL="432008" indent="0">
-              <a:buNone/>
-              <a:defRPr sz="1890" b="1"/>
+            <a:lvl2pPr marL="609585" indent="0">
+              <a:buNone/>
+              <a:defRPr sz="2667" b="1"/>
             </a:lvl2pPr>
-            <a:lvl3pPr marL="864017" indent="0">
-              <a:buNone/>
-              <a:defRPr sz="1701" b="1"/>
+            <a:lvl3pPr marL="1219170" indent="0">
+              <a:buNone/>
+              <a:defRPr sz="2400" b="1"/>
             </a:lvl3pPr>
-            <a:lvl4pPr marL="1296025" indent="0">
-              <a:buNone/>
-              <a:defRPr sz="1512" b="1"/>
+            <a:lvl4pPr marL="1828754" indent="0">
+              <a:buNone/>
+              <a:defRPr sz="2133" b="1"/>
             </a:lvl4pPr>
-            <a:lvl5pPr marL="1728033" indent="0">
-              <a:buNone/>
-              <a:defRPr sz="1512" b="1"/>
+            <a:lvl5pPr marL="2438339" indent="0">
+              <a:buNone/>
+              <a:defRPr sz="2133" b="1"/>
             </a:lvl5pPr>
-            <a:lvl6pPr marL="2160041" indent="0">
-              <a:buNone/>
-              <a:defRPr sz="1512" b="1"/>
+            <a:lvl6pPr marL="3047924" indent="0">
+              <a:buNone/>
+              <a:defRPr sz="2133" b="1"/>
             </a:lvl6pPr>
-            <a:lvl7pPr marL="2592050" indent="0">
-              <a:buNone/>
-              <a:defRPr sz="1512" b="1"/>
+            <a:lvl7pPr marL="3657509" indent="0">
+              <a:buNone/>
+              <a:defRPr sz="2133" b="1"/>
             </a:lvl7pPr>
-            <a:lvl8pPr marL="3024058" indent="0">
-              <a:buNone/>
-              <a:defRPr sz="1512" b="1"/>
+            <a:lvl8pPr marL="4267093" indent="0">
+              <a:buNone/>
+              <a:defRPr sz="2133" b="1"/>
             </a:lvl8pPr>
-            <a:lvl9pPr marL="3456066" indent="0">
-              <a:buNone/>
-              <a:defRPr sz="1512" b="1"/>
+            <a:lvl9pPr marL="4876678" indent="0">
+              <a:buNone/>
+              <a:defRPr sz="2133" b="1"/>
             </a:lvl9pPr>
           </a:lstStyle>
           <a:p>
             <a:pPr lvl="0"/>
             <a:r>
-              <a:rPr lang="en-GB"/>
+              <a:rPr lang="en-US"/>
               <a:t>Click to edit Master text styles</a:t>
             </a:r>
           </a:p>
@@ -1982,8 +1985,8 @@
         </p:nvSpPr>
         <p:spPr>
           <a:xfrm>
-            <a:off x="6172200" y="2367064"/>
-            <a:ext cx="5183188" cy="3481594"/>
+            <a:off x="6172201" y="4536969"/>
+            <a:ext cx="5183188" cy="6673198"/>
           </a:xfrm>
         </p:spPr>
         <p:txBody>
@@ -1992,35 +1995,35 @@
           <a:p>
             <a:pPr lvl="0"/>
             <a:r>
-              <a:rPr lang="en-GB"/>
+              <a:rPr lang="en-US"/>
               <a:t>Click to edit Master text styles</a:t>
             </a:r>
           </a:p>
           <a:p>
             <a:pPr lvl="1"/>
             <a:r>
-              <a:rPr lang="en-GB"/>
+              <a:rPr lang="en-US"/>
               <a:t>Second level</a:t>
             </a:r>
           </a:p>
           <a:p>
             <a:pPr lvl="2"/>
             <a:r>
-              <a:rPr lang="en-GB"/>
+              <a:rPr lang="en-US"/>
               <a:t>Third level</a:t>
             </a:r>
           </a:p>
           <a:p>
             <a:pPr lvl="3"/>
             <a:r>
-              <a:rPr lang="en-GB"/>
+              <a:rPr lang="en-US"/>
               <a:t>Fourth level</a:t>
             </a:r>
           </a:p>
           <a:p>
             <a:pPr lvl="4"/>
             <a:r>
-              <a:rPr lang="en-GB"/>
+              <a:rPr lang="en-US"/>
               <a:t>Fifth level</a:t>
             </a:r>
             <a:endParaRPr lang="en-US" dirty="0"/>
@@ -2044,7 +2047,7 @@
           <a:p>
             <a:fld id="{D6E15244-DF10-C54C-80B4-2BA48BDAEEC4}" type="datetimeFigureOut">
               <a:rPr lang="en-GB" smtClean="0"/>
-              <a:t>15/11/2022</a:t>
+              <a:t>11/12/2022</a:t>
             </a:fld>
             <a:endParaRPr lang="en-GB"/>
           </a:p>
@@ -2095,7 +2098,7 @@
     </p:spTree>
     <p:extLst>
       <p:ext uri="{BB962C8B-B14F-4D97-AF65-F5344CB8AC3E}">
-        <p14:creationId xmlns:p14="http://schemas.microsoft.com/office/powerpoint/2010/main" val="2010709643"/>
+        <p14:creationId xmlns:p14="http://schemas.microsoft.com/office/powerpoint/2010/main" val="2831165734"/>
       </p:ext>
     </p:extLst>
   </p:cSld>
@@ -2138,7 +2141,7 @@
           <a:lstStyle/>
           <a:p>
             <a:r>
-              <a:rPr lang="en-GB"/>
+              <a:rPr lang="en-US"/>
               <a:t>Click to edit Master title style</a:t>
             </a:r>
             <a:endParaRPr lang="en-US" dirty="0"/>
@@ -2162,7 +2165,7 @@
           <a:p>
             <a:fld id="{D6E15244-DF10-C54C-80B4-2BA48BDAEEC4}" type="datetimeFigureOut">
               <a:rPr lang="en-GB" smtClean="0"/>
-              <a:t>15/11/2022</a:t>
+              <a:t>11/12/2022</a:t>
             </a:fld>
             <a:endParaRPr lang="en-GB"/>
           </a:p>
@@ -2213,7 +2216,7 @@
     </p:spTree>
     <p:extLst>
       <p:ext uri="{BB962C8B-B14F-4D97-AF65-F5344CB8AC3E}">
-        <p14:creationId xmlns:p14="http://schemas.microsoft.com/office/powerpoint/2010/main" val="3655625718"/>
+        <p14:creationId xmlns:p14="http://schemas.microsoft.com/office/powerpoint/2010/main" val="297620480"/>
       </p:ext>
     </p:extLst>
   </p:cSld>
@@ -2257,7 +2260,7 @@
           <a:p>
             <a:fld id="{D6E15244-DF10-C54C-80B4-2BA48BDAEEC4}" type="datetimeFigureOut">
               <a:rPr lang="en-GB" smtClean="0"/>
-              <a:t>15/11/2022</a:t>
+              <a:t>11/12/2022</a:t>
             </a:fld>
             <a:endParaRPr lang="en-GB"/>
           </a:p>
@@ -2308,7 +2311,7 @@
     </p:spTree>
     <p:extLst>
       <p:ext uri="{BB962C8B-B14F-4D97-AF65-F5344CB8AC3E}">
-        <p14:creationId xmlns:p14="http://schemas.microsoft.com/office/powerpoint/2010/main" val="3844163294"/>
+        <p14:creationId xmlns:p14="http://schemas.microsoft.com/office/powerpoint/2010/main" val="2404793043"/>
       </p:ext>
     </p:extLst>
   </p:cSld>
@@ -2347,20 +2350,20 @@
         </p:nvSpPr>
         <p:spPr>
           <a:xfrm>
-            <a:off x="839789" y="432012"/>
-            <a:ext cx="3932237" cy="1512041"/>
+            <a:off x="839788" y="828040"/>
+            <a:ext cx="3932237" cy="2898140"/>
           </a:xfrm>
         </p:spPr>
         <p:txBody>
           <a:bodyPr anchor="b"/>
           <a:lstStyle>
             <a:lvl1pPr>
-              <a:defRPr sz="3024"/>
+              <a:defRPr sz="4267"/>
             </a:lvl1pPr>
           </a:lstStyle>
           <a:p>
             <a:r>
-              <a:rPr lang="en-GB"/>
+              <a:rPr lang="en-US"/>
               <a:t>Click to edit Master title style</a:t>
             </a:r>
             <a:endParaRPr lang="en-US" dirty="0"/>
@@ -2379,73 +2382,73 @@
         </p:nvSpPr>
         <p:spPr>
           <a:xfrm>
-            <a:off x="5183188" y="933026"/>
-            <a:ext cx="6172200" cy="4605124"/>
+            <a:off x="5183188" y="1788339"/>
+            <a:ext cx="6172200" cy="8826676"/>
           </a:xfrm>
         </p:spPr>
         <p:txBody>
           <a:bodyPr/>
           <a:lstStyle>
             <a:lvl1pPr>
-              <a:defRPr sz="3024"/>
+              <a:defRPr sz="4267"/>
             </a:lvl1pPr>
             <a:lvl2pPr>
-              <a:defRPr sz="2646"/>
+              <a:defRPr sz="3733"/>
             </a:lvl2pPr>
             <a:lvl3pPr>
-              <a:defRPr sz="2268"/>
+              <a:defRPr sz="3200"/>
             </a:lvl3pPr>
             <a:lvl4pPr>
-              <a:defRPr sz="1890"/>
+              <a:defRPr sz="2667"/>
             </a:lvl4pPr>
             <a:lvl5pPr>
-              <a:defRPr sz="1890"/>
+              <a:defRPr sz="2667"/>
             </a:lvl5pPr>
             <a:lvl6pPr>
-              <a:defRPr sz="1890"/>
+              <a:defRPr sz="2667"/>
             </a:lvl6pPr>
             <a:lvl7pPr>
-              <a:defRPr sz="1890"/>
+              <a:defRPr sz="2667"/>
             </a:lvl7pPr>
             <a:lvl8pPr>
-              <a:defRPr sz="1890"/>
+              <a:defRPr sz="2667"/>
             </a:lvl8pPr>
             <a:lvl9pPr>
-              <a:defRPr sz="1890"/>
+              <a:defRPr sz="2667"/>
             </a:lvl9pPr>
           </a:lstStyle>
           <a:p>
             <a:pPr lvl="0"/>
             <a:r>
-              <a:rPr lang="en-GB"/>
+              <a:rPr lang="en-US"/>
               <a:t>Click to edit Master text styles</a:t>
             </a:r>
           </a:p>
           <a:p>
             <a:pPr lvl="1"/>
             <a:r>
-              <a:rPr lang="en-GB"/>
+              <a:rPr lang="en-US"/>
               <a:t>Second level</a:t>
             </a:r>
           </a:p>
           <a:p>
             <a:pPr lvl="2"/>
             <a:r>
-              <a:rPr lang="en-GB"/>
+              <a:rPr lang="en-US"/>
               <a:t>Third level</a:t>
             </a:r>
           </a:p>
           <a:p>
             <a:pPr lvl="3"/>
             <a:r>
-              <a:rPr lang="en-GB"/>
+              <a:rPr lang="en-US"/>
               <a:t>Fourth level</a:t>
             </a:r>
           </a:p>
           <a:p>
             <a:pPr lvl="4"/>
             <a:r>
-              <a:rPr lang="en-GB"/>
+              <a:rPr lang="en-US"/>
               <a:t>Fifth level</a:t>
             </a:r>
             <a:endParaRPr lang="en-US" dirty="0"/>
@@ -2464,8 +2467,8 @@
         </p:nvSpPr>
         <p:spPr>
           <a:xfrm>
-            <a:off x="839789" y="1944052"/>
-            <a:ext cx="3932237" cy="3601598"/>
+            <a:off x="839788" y="3726180"/>
+            <a:ext cx="3932237" cy="6903209"/>
           </a:xfrm>
         </p:spPr>
         <p:txBody>
@@ -2473,45 +2476,45 @@
           <a:lstStyle>
             <a:lvl1pPr marL="0" indent="0">
               <a:buNone/>
-              <a:defRPr sz="1512"/>
+              <a:defRPr sz="2133"/>
             </a:lvl1pPr>
-            <a:lvl2pPr marL="432008" indent="0">
-              <a:buNone/>
-              <a:defRPr sz="1323"/>
+            <a:lvl2pPr marL="609585" indent="0">
+              <a:buNone/>
+              <a:defRPr sz="1867"/>
             </a:lvl2pPr>
-            <a:lvl3pPr marL="864017" indent="0">
-              <a:buNone/>
-              <a:defRPr sz="1134"/>
+            <a:lvl3pPr marL="1219170" indent="0">
+              <a:buNone/>
+              <a:defRPr sz="1600"/>
             </a:lvl3pPr>
-            <a:lvl4pPr marL="1296025" indent="0">
-              <a:buNone/>
-              <a:defRPr sz="945"/>
+            <a:lvl4pPr marL="1828754" indent="0">
+              <a:buNone/>
+              <a:defRPr sz="1333"/>
             </a:lvl4pPr>
-            <a:lvl5pPr marL="1728033" indent="0">
-              <a:buNone/>
-              <a:defRPr sz="945"/>
+            <a:lvl5pPr marL="2438339" indent="0">
+              <a:buNone/>
+              <a:defRPr sz="1333"/>
             </a:lvl5pPr>
-            <a:lvl6pPr marL="2160041" indent="0">
-              <a:buNone/>
-              <a:defRPr sz="945"/>
+            <a:lvl6pPr marL="3047924" indent="0">
+              <a:buNone/>
+              <a:defRPr sz="1333"/>
             </a:lvl6pPr>
-            <a:lvl7pPr marL="2592050" indent="0">
-              <a:buNone/>
-              <a:defRPr sz="945"/>
+            <a:lvl7pPr marL="3657509" indent="0">
+              <a:buNone/>
+              <a:defRPr sz="1333"/>
             </a:lvl7pPr>
-            <a:lvl8pPr marL="3024058" indent="0">
-              <a:buNone/>
-              <a:defRPr sz="945"/>
+            <a:lvl8pPr marL="4267093" indent="0">
+              <a:buNone/>
+              <a:defRPr sz="1333"/>
             </a:lvl8pPr>
-            <a:lvl9pPr marL="3456066" indent="0">
-              <a:buNone/>
-              <a:defRPr sz="945"/>
+            <a:lvl9pPr marL="4876678" indent="0">
+              <a:buNone/>
+              <a:defRPr sz="1333"/>
             </a:lvl9pPr>
           </a:lstStyle>
           <a:p>
             <a:pPr lvl="0"/>
             <a:r>
-              <a:rPr lang="en-GB"/>
+              <a:rPr lang="en-US"/>
               <a:t>Click to edit Master text styles</a:t>
             </a:r>
           </a:p>
@@ -2534,7 +2537,7 @@
           <a:p>
             <a:fld id="{D6E15244-DF10-C54C-80B4-2BA48BDAEEC4}" type="datetimeFigureOut">
               <a:rPr lang="en-GB" smtClean="0"/>
-              <a:t>15/11/2022</a:t>
+              <a:t>11/12/2022</a:t>
             </a:fld>
             <a:endParaRPr lang="en-GB"/>
           </a:p>
@@ -2585,7 +2588,7 @@
     </p:spTree>
     <p:extLst>
       <p:ext uri="{BB962C8B-B14F-4D97-AF65-F5344CB8AC3E}">
-        <p14:creationId xmlns:p14="http://schemas.microsoft.com/office/powerpoint/2010/main" val="2111920047"/>
+        <p14:creationId xmlns:p14="http://schemas.microsoft.com/office/powerpoint/2010/main" val="3570836319"/>
       </p:ext>
     </p:extLst>
   </p:cSld>
@@ -2624,20 +2627,20 @@
         </p:nvSpPr>
         <p:spPr>
           <a:xfrm>
-            <a:off x="839789" y="432012"/>
-            <a:ext cx="3932237" cy="1512041"/>
+            <a:off x="839788" y="828040"/>
+            <a:ext cx="3932237" cy="2898140"/>
           </a:xfrm>
         </p:spPr>
         <p:txBody>
           <a:bodyPr anchor="b"/>
           <a:lstStyle>
             <a:lvl1pPr>
-              <a:defRPr sz="3024"/>
+              <a:defRPr sz="4267"/>
             </a:lvl1pPr>
           </a:lstStyle>
           <a:p>
             <a:r>
-              <a:rPr lang="en-GB"/>
+              <a:rPr lang="en-US"/>
               <a:t>Click to edit Master title style</a:t>
             </a:r>
             <a:endParaRPr lang="en-US" dirty="0"/>
@@ -2656,8 +2659,8 @@
         </p:nvSpPr>
         <p:spPr>
           <a:xfrm>
-            <a:off x="5183188" y="933026"/>
-            <a:ext cx="6172200" cy="4605124"/>
+            <a:off x="5183188" y="1788339"/>
+            <a:ext cx="6172200" cy="8826676"/>
           </a:xfrm>
         </p:spPr>
         <p:txBody>
@@ -2665,44 +2668,44 @@
           <a:lstStyle>
             <a:lvl1pPr marL="0" indent="0">
               <a:buNone/>
-              <a:defRPr sz="3024"/>
+              <a:defRPr sz="4267"/>
             </a:lvl1pPr>
-            <a:lvl2pPr marL="432008" indent="0">
-              <a:buNone/>
-              <a:defRPr sz="2646"/>
+            <a:lvl2pPr marL="609585" indent="0">
+              <a:buNone/>
+              <a:defRPr sz="3733"/>
             </a:lvl2pPr>
-            <a:lvl3pPr marL="864017" indent="0">
-              <a:buNone/>
-              <a:defRPr sz="2268"/>
+            <a:lvl3pPr marL="1219170" indent="0">
+              <a:buNone/>
+              <a:defRPr sz="3200"/>
             </a:lvl3pPr>
-            <a:lvl4pPr marL="1296025" indent="0">
-              <a:buNone/>
-              <a:defRPr sz="1890"/>
+            <a:lvl4pPr marL="1828754" indent="0">
+              <a:buNone/>
+              <a:defRPr sz="2667"/>
             </a:lvl4pPr>
-            <a:lvl5pPr marL="1728033" indent="0">
-              <a:buNone/>
-              <a:defRPr sz="1890"/>
+            <a:lvl5pPr marL="2438339" indent="0">
+              <a:buNone/>
+              <a:defRPr sz="2667"/>
             </a:lvl5pPr>
-            <a:lvl6pPr marL="2160041" indent="0">
-              <a:buNone/>
-              <a:defRPr sz="1890"/>
+            <a:lvl6pPr marL="3047924" indent="0">
+              <a:buNone/>
+              <a:defRPr sz="2667"/>
             </a:lvl6pPr>
-            <a:lvl7pPr marL="2592050" indent="0">
-              <a:buNone/>
-              <a:defRPr sz="1890"/>
+            <a:lvl7pPr marL="3657509" indent="0">
+              <a:buNone/>
+              <a:defRPr sz="2667"/>
             </a:lvl7pPr>
-            <a:lvl8pPr marL="3024058" indent="0">
-              <a:buNone/>
-              <a:defRPr sz="1890"/>
+            <a:lvl8pPr marL="4267093" indent="0">
+              <a:buNone/>
+              <a:defRPr sz="2667"/>
             </a:lvl8pPr>
-            <a:lvl9pPr marL="3456066" indent="0">
-              <a:buNone/>
-              <a:defRPr sz="1890"/>
+            <a:lvl9pPr marL="4876678" indent="0">
+              <a:buNone/>
+              <a:defRPr sz="2667"/>
             </a:lvl9pPr>
           </a:lstStyle>
           <a:p>
             <a:r>
-              <a:rPr lang="en-GB"/>
+              <a:rPr lang="en-US"/>
               <a:t>Click icon to add picture</a:t>
             </a:r>
             <a:endParaRPr lang="en-US" dirty="0"/>
@@ -2721,8 +2724,8 @@
         </p:nvSpPr>
         <p:spPr>
           <a:xfrm>
-            <a:off x="839789" y="1944052"/>
-            <a:ext cx="3932237" cy="3601598"/>
+            <a:off x="839788" y="3726180"/>
+            <a:ext cx="3932237" cy="6903209"/>
           </a:xfrm>
         </p:spPr>
         <p:txBody>
@@ -2730,45 +2733,45 @@
           <a:lstStyle>
             <a:lvl1pPr marL="0" indent="0">
               <a:buNone/>
-              <a:defRPr sz="1512"/>
+              <a:defRPr sz="2133"/>
             </a:lvl1pPr>
-            <a:lvl2pPr marL="432008" indent="0">
-              <a:buNone/>
-              <a:defRPr sz="1323"/>
+            <a:lvl2pPr marL="609585" indent="0">
+              <a:buNone/>
+              <a:defRPr sz="1867"/>
             </a:lvl2pPr>
-            <a:lvl3pPr marL="864017" indent="0">
-              <a:buNone/>
-              <a:defRPr sz="1134"/>
+            <a:lvl3pPr marL="1219170" indent="0">
+              <a:buNone/>
+              <a:defRPr sz="1600"/>
             </a:lvl3pPr>
-            <a:lvl4pPr marL="1296025" indent="0">
-              <a:buNone/>
-              <a:defRPr sz="945"/>
+            <a:lvl4pPr marL="1828754" indent="0">
+              <a:buNone/>
+              <a:defRPr sz="1333"/>
             </a:lvl4pPr>
-            <a:lvl5pPr marL="1728033" indent="0">
-              <a:buNone/>
-              <a:defRPr sz="945"/>
+            <a:lvl5pPr marL="2438339" indent="0">
+              <a:buNone/>
+              <a:defRPr sz="1333"/>
             </a:lvl5pPr>
-            <a:lvl6pPr marL="2160041" indent="0">
-              <a:buNone/>
-              <a:defRPr sz="945"/>
+            <a:lvl6pPr marL="3047924" indent="0">
+              <a:buNone/>
+              <a:defRPr sz="1333"/>
             </a:lvl6pPr>
-            <a:lvl7pPr marL="2592050" indent="0">
-              <a:buNone/>
-              <a:defRPr sz="945"/>
+            <a:lvl7pPr marL="3657509" indent="0">
+              <a:buNone/>
+              <a:defRPr sz="1333"/>
             </a:lvl7pPr>
-            <a:lvl8pPr marL="3024058" indent="0">
-              <a:buNone/>
-              <a:defRPr sz="945"/>
+            <a:lvl8pPr marL="4267093" indent="0">
+              <a:buNone/>
+              <a:defRPr sz="1333"/>
             </a:lvl8pPr>
-            <a:lvl9pPr marL="3456066" indent="0">
-              <a:buNone/>
-              <a:defRPr sz="945"/>
+            <a:lvl9pPr marL="4876678" indent="0">
+              <a:buNone/>
+              <a:defRPr sz="1333"/>
             </a:lvl9pPr>
           </a:lstStyle>
           <a:p>
             <a:pPr lvl="0"/>
             <a:r>
-              <a:rPr lang="en-GB"/>
+              <a:rPr lang="en-US"/>
               <a:t>Click to edit Master text styles</a:t>
             </a:r>
           </a:p>
@@ -2791,7 +2794,7 @@
           <a:p>
             <a:fld id="{D6E15244-DF10-C54C-80B4-2BA48BDAEEC4}" type="datetimeFigureOut">
               <a:rPr lang="en-GB" smtClean="0"/>
-              <a:t>15/11/2022</a:t>
+              <a:t>11/12/2022</a:t>
             </a:fld>
             <a:endParaRPr lang="en-GB"/>
           </a:p>
@@ -2842,7 +2845,7 @@
     </p:spTree>
     <p:extLst>
       <p:ext uri="{BB962C8B-B14F-4D97-AF65-F5344CB8AC3E}">
-        <p14:creationId xmlns:p14="http://schemas.microsoft.com/office/powerpoint/2010/main" val="152624893"/>
+        <p14:creationId xmlns:p14="http://schemas.microsoft.com/office/powerpoint/2010/main" val="3092557035"/>
       </p:ext>
     </p:extLst>
   </p:cSld>
@@ -2886,8 +2889,8 @@
         </p:nvSpPr>
         <p:spPr>
           <a:xfrm>
-            <a:off x="838200" y="345010"/>
-            <a:ext cx="10515600" cy="1252534"/>
+            <a:off x="838200" y="661285"/>
+            <a:ext cx="10515600" cy="2400742"/>
           </a:xfrm>
           <a:prstGeom prst="rect">
             <a:avLst/>
@@ -2900,7 +2903,7 @@
           <a:lstStyle/>
           <a:p>
             <a:r>
-              <a:rPr lang="en-GB"/>
+              <a:rPr lang="en-US"/>
               <a:t>Click to edit Master title style</a:t>
             </a:r>
             <a:endParaRPr lang="en-US" dirty="0"/>
@@ -2919,8 +2922,8 @@
         </p:nvSpPr>
         <p:spPr>
           <a:xfrm>
-            <a:off x="838200" y="1725046"/>
-            <a:ext cx="10515600" cy="4111612"/>
+            <a:off x="838200" y="3306410"/>
+            <a:ext cx="10515600" cy="7880757"/>
           </a:xfrm>
           <a:prstGeom prst="rect">
             <a:avLst/>
@@ -2934,35 +2937,35 @@
           <a:p>
             <a:pPr lvl="0"/>
             <a:r>
-              <a:rPr lang="en-GB"/>
+              <a:rPr lang="en-US"/>
               <a:t>Click to edit Master text styles</a:t>
             </a:r>
           </a:p>
           <a:p>
             <a:pPr lvl="1"/>
             <a:r>
-              <a:rPr lang="en-GB"/>
+              <a:rPr lang="en-US"/>
               <a:t>Second level</a:t>
             </a:r>
           </a:p>
           <a:p>
             <a:pPr lvl="2"/>
             <a:r>
-              <a:rPr lang="en-GB"/>
+              <a:rPr lang="en-US"/>
               <a:t>Third level</a:t>
             </a:r>
           </a:p>
           <a:p>
             <a:pPr lvl="3"/>
             <a:r>
-              <a:rPr lang="en-GB"/>
+              <a:rPr lang="en-US"/>
               <a:t>Fourth level</a:t>
             </a:r>
           </a:p>
           <a:p>
             <a:pPr lvl="4"/>
             <a:r>
-              <a:rPr lang="en-GB"/>
+              <a:rPr lang="en-US"/>
               <a:t>Fifth level</a:t>
             </a:r>
             <a:endParaRPr lang="en-US" dirty="0"/>
@@ -2981,8 +2984,8 @@
         </p:nvSpPr>
         <p:spPr>
           <a:xfrm>
-            <a:off x="838200" y="6006163"/>
-            <a:ext cx="2743200" cy="345009"/>
+            <a:off x="838200" y="11512059"/>
+            <a:ext cx="2743200" cy="661282"/>
           </a:xfrm>
           <a:prstGeom prst="rect">
             <a:avLst/>
@@ -2992,7 +2995,7 @@
           <a:bodyPr vert="horz" lIns="91440" tIns="45720" rIns="91440" bIns="45720" rtlCol="0" anchor="ctr"/>
           <a:lstStyle>
             <a:lvl1pPr algn="l">
-              <a:defRPr sz="1134">
+              <a:defRPr sz="1600">
                 <a:solidFill>
                   <a:schemeClr val="tx1">
                     <a:tint val="75000"/>
@@ -3004,7 +3007,7 @@
           <a:p>
             <a:fld id="{D6E15244-DF10-C54C-80B4-2BA48BDAEEC4}" type="datetimeFigureOut">
               <a:rPr lang="en-GB" smtClean="0"/>
-              <a:t>15/11/2022</a:t>
+              <a:t>11/12/2022</a:t>
             </a:fld>
             <a:endParaRPr lang="en-GB"/>
           </a:p>
@@ -3022,8 +3025,8 @@
         </p:nvSpPr>
         <p:spPr>
           <a:xfrm>
-            <a:off x="4038600" y="6006163"/>
-            <a:ext cx="4114800" cy="345009"/>
+            <a:off x="4038600" y="11512059"/>
+            <a:ext cx="4114800" cy="661282"/>
           </a:xfrm>
           <a:prstGeom prst="rect">
             <a:avLst/>
@@ -3033,7 +3036,7 @@
           <a:bodyPr vert="horz" lIns="91440" tIns="45720" rIns="91440" bIns="45720" rtlCol="0" anchor="ctr"/>
           <a:lstStyle>
             <a:lvl1pPr algn="ctr">
-              <a:defRPr sz="1134">
+              <a:defRPr sz="1600">
                 <a:solidFill>
                   <a:schemeClr val="tx1">
                     <a:tint val="75000"/>
@@ -3059,8 +3062,8 @@
         </p:nvSpPr>
         <p:spPr>
           <a:xfrm>
-            <a:off x="8610600" y="6006163"/>
-            <a:ext cx="2743200" cy="345009"/>
+            <a:off x="8610600" y="11512059"/>
+            <a:ext cx="2743200" cy="661282"/>
           </a:xfrm>
           <a:prstGeom prst="rect">
             <a:avLst/>
@@ -3070,7 +3073,7 @@
           <a:bodyPr vert="horz" lIns="91440" tIns="45720" rIns="91440" bIns="45720" rtlCol="0" anchor="ctr"/>
           <a:lstStyle>
             <a:lvl1pPr algn="r">
-              <a:defRPr sz="1134">
+              <a:defRPr sz="1600">
                 <a:solidFill>
                   <a:schemeClr val="tx1">
                     <a:tint val="75000"/>
@@ -3091,27 +3094,27 @@
     </p:spTree>
     <p:extLst>
       <p:ext uri="{BB962C8B-B14F-4D97-AF65-F5344CB8AC3E}">
-        <p14:creationId xmlns:p14="http://schemas.microsoft.com/office/powerpoint/2010/main" val="554348753"/>
+        <p14:creationId xmlns:p14="http://schemas.microsoft.com/office/powerpoint/2010/main" val="94575232"/>
       </p:ext>
     </p:extLst>
   </p:cSld>
   <p:clrMap bg1="lt1" tx1="dk1" bg2="lt2" tx2="dk2" accent1="accent1" accent2="accent2" accent3="accent3" accent4="accent4" accent5="accent5" accent6="accent6" hlink="hlink" folHlink="folHlink"/>
   <p:sldLayoutIdLst>
-    <p:sldLayoutId id="2147483673" r:id="rId1"/>
-    <p:sldLayoutId id="2147483674" r:id="rId2"/>
-    <p:sldLayoutId id="2147483675" r:id="rId3"/>
-    <p:sldLayoutId id="2147483676" r:id="rId4"/>
-    <p:sldLayoutId id="2147483677" r:id="rId5"/>
-    <p:sldLayoutId id="2147483678" r:id="rId6"/>
-    <p:sldLayoutId id="2147483679" r:id="rId7"/>
-    <p:sldLayoutId id="2147483680" r:id="rId8"/>
-    <p:sldLayoutId id="2147483681" r:id="rId9"/>
-    <p:sldLayoutId id="2147483682" r:id="rId10"/>
-    <p:sldLayoutId id="2147483683" r:id="rId11"/>
+    <p:sldLayoutId id="2147483709" r:id="rId1"/>
+    <p:sldLayoutId id="2147483710" r:id="rId2"/>
+    <p:sldLayoutId id="2147483711" r:id="rId3"/>
+    <p:sldLayoutId id="2147483712" r:id="rId4"/>
+    <p:sldLayoutId id="2147483713" r:id="rId5"/>
+    <p:sldLayoutId id="2147483714" r:id="rId6"/>
+    <p:sldLayoutId id="2147483715" r:id="rId7"/>
+    <p:sldLayoutId id="2147483716" r:id="rId8"/>
+    <p:sldLayoutId id="2147483717" r:id="rId9"/>
+    <p:sldLayoutId id="2147483718" r:id="rId10"/>
+    <p:sldLayoutId id="2147483719" r:id="rId11"/>
   </p:sldLayoutIdLst>
   <p:txStyles>
     <p:titleStyle>
-      <a:lvl1pPr algn="l" defTabSz="864017" rtl="0" eaLnBrk="1" latinLnBrk="0" hangingPunct="1">
+      <a:lvl1pPr algn="l" defTabSz="1219170" rtl="0" eaLnBrk="1" latinLnBrk="0" hangingPunct="1">
         <a:lnSpc>
           <a:spcPct val="90000"/>
         </a:lnSpc>
@@ -3119,7 +3122,7 @@
           <a:spcPct val="0"/>
         </a:spcBef>
         <a:buNone/>
-        <a:defRPr sz="4158" kern="1200">
+        <a:defRPr sz="5867" kern="1200">
           <a:solidFill>
             <a:schemeClr val="tx1"/>
           </a:solidFill>
@@ -3130,16 +3133,16 @@
       </a:lvl1pPr>
     </p:titleStyle>
     <p:bodyStyle>
-      <a:lvl1pPr marL="216004" indent="-216004" algn="l" defTabSz="864017" rtl="0" eaLnBrk="1" latinLnBrk="0" hangingPunct="1">
+      <a:lvl1pPr marL="304792" indent="-304792" algn="l" defTabSz="1219170" rtl="0" eaLnBrk="1" latinLnBrk="0" hangingPunct="1">
         <a:lnSpc>
           <a:spcPct val="90000"/>
         </a:lnSpc>
         <a:spcBef>
-          <a:spcPts val="945"/>
+          <a:spcPts val="1333"/>
         </a:spcBef>
         <a:buFont typeface="Arial" panose="020B0604020202020204" pitchFamily="34" charset="0"/>
         <a:buChar char="•"/>
-        <a:defRPr sz="2646" kern="1200">
+        <a:defRPr sz="3733" kern="1200">
           <a:solidFill>
             <a:schemeClr val="tx1"/>
           </a:solidFill>
@@ -3148,16 +3151,16 @@
           <a:cs typeface="+mn-cs"/>
         </a:defRPr>
       </a:lvl1pPr>
-      <a:lvl2pPr marL="648012" indent="-216004" algn="l" defTabSz="864017" rtl="0" eaLnBrk="1" latinLnBrk="0" hangingPunct="1">
+      <a:lvl2pPr marL="914377" indent="-304792" algn="l" defTabSz="1219170" rtl="0" eaLnBrk="1" latinLnBrk="0" hangingPunct="1">
         <a:lnSpc>
           <a:spcPct val="90000"/>
         </a:lnSpc>
         <a:spcBef>
-          <a:spcPts val="472"/>
+          <a:spcPts val="667"/>
         </a:spcBef>
         <a:buFont typeface="Arial" panose="020B0604020202020204" pitchFamily="34" charset="0"/>
         <a:buChar char="•"/>
-        <a:defRPr sz="2268" kern="1200">
+        <a:defRPr sz="3200" kern="1200">
           <a:solidFill>
             <a:schemeClr val="tx1"/>
           </a:solidFill>
@@ -3166,16 +3169,16 @@
           <a:cs typeface="+mn-cs"/>
         </a:defRPr>
       </a:lvl2pPr>
-      <a:lvl3pPr marL="1080021" indent="-216004" algn="l" defTabSz="864017" rtl="0" eaLnBrk="1" latinLnBrk="0" hangingPunct="1">
+      <a:lvl3pPr marL="1523962" indent="-304792" algn="l" defTabSz="1219170" rtl="0" eaLnBrk="1" latinLnBrk="0" hangingPunct="1">
         <a:lnSpc>
           <a:spcPct val="90000"/>
         </a:lnSpc>
         <a:spcBef>
-          <a:spcPts val="472"/>
+          <a:spcPts val="667"/>
         </a:spcBef>
         <a:buFont typeface="Arial" panose="020B0604020202020204" pitchFamily="34" charset="0"/>
         <a:buChar char="•"/>
-        <a:defRPr sz="1890" kern="1200">
+        <a:defRPr sz="2667" kern="1200">
           <a:solidFill>
             <a:schemeClr val="tx1"/>
           </a:solidFill>
@@ -3184,16 +3187,16 @@
           <a:cs typeface="+mn-cs"/>
         </a:defRPr>
       </a:lvl3pPr>
-      <a:lvl4pPr marL="1512029" indent="-216004" algn="l" defTabSz="864017" rtl="0" eaLnBrk="1" latinLnBrk="0" hangingPunct="1">
+      <a:lvl4pPr marL="2133547" indent="-304792" algn="l" defTabSz="1219170" rtl="0" eaLnBrk="1" latinLnBrk="0" hangingPunct="1">
         <a:lnSpc>
           <a:spcPct val="90000"/>
         </a:lnSpc>
         <a:spcBef>
-          <a:spcPts val="472"/>
+          <a:spcPts val="667"/>
         </a:spcBef>
         <a:buFont typeface="Arial" panose="020B0604020202020204" pitchFamily="34" charset="0"/>
         <a:buChar char="•"/>
-        <a:defRPr sz="1701" kern="1200">
+        <a:defRPr sz="2400" kern="1200">
           <a:solidFill>
             <a:schemeClr val="tx1"/>
           </a:solidFill>
@@ -3202,16 +3205,16 @@
           <a:cs typeface="+mn-cs"/>
         </a:defRPr>
       </a:lvl4pPr>
-      <a:lvl5pPr marL="1944037" indent="-216004" algn="l" defTabSz="864017" rtl="0" eaLnBrk="1" latinLnBrk="0" hangingPunct="1">
+      <a:lvl5pPr marL="2743131" indent="-304792" algn="l" defTabSz="1219170" rtl="0" eaLnBrk="1" latinLnBrk="0" hangingPunct="1">
         <a:lnSpc>
           <a:spcPct val="90000"/>
         </a:lnSpc>
         <a:spcBef>
-          <a:spcPts val="472"/>
+          <a:spcPts val="667"/>
         </a:spcBef>
         <a:buFont typeface="Arial" panose="020B0604020202020204" pitchFamily="34" charset="0"/>
         <a:buChar char="•"/>
-        <a:defRPr sz="1701" kern="1200">
+        <a:defRPr sz="2400" kern="1200">
           <a:solidFill>
             <a:schemeClr val="tx1"/>
           </a:solidFill>
@@ -3220,16 +3223,16 @@
           <a:cs typeface="+mn-cs"/>
         </a:defRPr>
       </a:lvl5pPr>
-      <a:lvl6pPr marL="2376046" indent="-216004" algn="l" defTabSz="864017" rtl="0" eaLnBrk="1" latinLnBrk="0" hangingPunct="1">
+      <a:lvl6pPr marL="3352716" indent="-304792" algn="l" defTabSz="1219170" rtl="0" eaLnBrk="1" latinLnBrk="0" hangingPunct="1">
         <a:lnSpc>
           <a:spcPct val="90000"/>
         </a:lnSpc>
         <a:spcBef>
-          <a:spcPts val="472"/>
+          <a:spcPts val="667"/>
         </a:spcBef>
         <a:buFont typeface="Arial" panose="020B0604020202020204" pitchFamily="34" charset="0"/>
         <a:buChar char="•"/>
-        <a:defRPr sz="1701" kern="1200">
+        <a:defRPr sz="2400" kern="1200">
           <a:solidFill>
             <a:schemeClr val="tx1"/>
           </a:solidFill>
@@ -3238,16 +3241,16 @@
           <a:cs typeface="+mn-cs"/>
         </a:defRPr>
       </a:lvl6pPr>
-      <a:lvl7pPr marL="2808054" indent="-216004" algn="l" defTabSz="864017" rtl="0" eaLnBrk="1" latinLnBrk="0" hangingPunct="1">
+      <a:lvl7pPr marL="3962301" indent="-304792" algn="l" defTabSz="1219170" rtl="0" eaLnBrk="1" latinLnBrk="0" hangingPunct="1">
         <a:lnSpc>
           <a:spcPct val="90000"/>
         </a:lnSpc>
         <a:spcBef>
-          <a:spcPts val="472"/>
+          <a:spcPts val="667"/>
         </a:spcBef>
         <a:buFont typeface="Arial" panose="020B0604020202020204" pitchFamily="34" charset="0"/>
         <a:buChar char="•"/>
-        <a:defRPr sz="1701" kern="1200">
+        <a:defRPr sz="2400" kern="1200">
           <a:solidFill>
             <a:schemeClr val="tx1"/>
           </a:solidFill>
@@ -3256,16 +3259,16 @@
           <a:cs typeface="+mn-cs"/>
         </a:defRPr>
       </a:lvl7pPr>
-      <a:lvl8pPr marL="3240062" indent="-216004" algn="l" defTabSz="864017" rtl="0" eaLnBrk="1" latinLnBrk="0" hangingPunct="1">
+      <a:lvl8pPr marL="4571886" indent="-304792" algn="l" defTabSz="1219170" rtl="0" eaLnBrk="1" latinLnBrk="0" hangingPunct="1">
         <a:lnSpc>
           <a:spcPct val="90000"/>
         </a:lnSpc>
         <a:spcBef>
-          <a:spcPts val="472"/>
+          <a:spcPts val="667"/>
         </a:spcBef>
         <a:buFont typeface="Arial" panose="020B0604020202020204" pitchFamily="34" charset="0"/>
         <a:buChar char="•"/>
-        <a:defRPr sz="1701" kern="1200">
+        <a:defRPr sz="2400" kern="1200">
           <a:solidFill>
             <a:schemeClr val="tx1"/>
           </a:solidFill>
@@ -3274,16 +3277,16 @@
           <a:cs typeface="+mn-cs"/>
         </a:defRPr>
       </a:lvl8pPr>
-      <a:lvl9pPr marL="3672070" indent="-216004" algn="l" defTabSz="864017" rtl="0" eaLnBrk="1" latinLnBrk="0" hangingPunct="1">
+      <a:lvl9pPr marL="5181470" indent="-304792" algn="l" defTabSz="1219170" rtl="0" eaLnBrk="1" latinLnBrk="0" hangingPunct="1">
         <a:lnSpc>
           <a:spcPct val="90000"/>
         </a:lnSpc>
         <a:spcBef>
-          <a:spcPts val="472"/>
+          <a:spcPts val="667"/>
         </a:spcBef>
         <a:buFont typeface="Arial" panose="020B0604020202020204" pitchFamily="34" charset="0"/>
         <a:buChar char="•"/>
-        <a:defRPr sz="1701" kern="1200">
+        <a:defRPr sz="2400" kern="1200">
           <a:solidFill>
             <a:schemeClr val="tx1"/>
           </a:solidFill>
@@ -3297,8 +3300,8 @@
       <a:defPPr>
         <a:defRPr lang="en-US"/>
       </a:defPPr>
-      <a:lvl1pPr marL="0" algn="l" defTabSz="864017" rtl="0" eaLnBrk="1" latinLnBrk="0" hangingPunct="1">
-        <a:defRPr sz="1701" kern="1200">
+      <a:lvl1pPr marL="0" algn="l" defTabSz="1219170" rtl="0" eaLnBrk="1" latinLnBrk="0" hangingPunct="1">
+        <a:defRPr sz="2400" kern="1200">
           <a:solidFill>
             <a:schemeClr val="tx1"/>
           </a:solidFill>
@@ -3307,8 +3310,8 @@
           <a:cs typeface="+mn-cs"/>
         </a:defRPr>
       </a:lvl1pPr>
-      <a:lvl2pPr marL="432008" algn="l" defTabSz="864017" rtl="0" eaLnBrk="1" latinLnBrk="0" hangingPunct="1">
-        <a:defRPr sz="1701" kern="1200">
+      <a:lvl2pPr marL="609585" algn="l" defTabSz="1219170" rtl="0" eaLnBrk="1" latinLnBrk="0" hangingPunct="1">
+        <a:defRPr sz="2400" kern="1200">
           <a:solidFill>
             <a:schemeClr val="tx1"/>
           </a:solidFill>
@@ -3317,8 +3320,8 @@
           <a:cs typeface="+mn-cs"/>
         </a:defRPr>
       </a:lvl2pPr>
-      <a:lvl3pPr marL="864017" algn="l" defTabSz="864017" rtl="0" eaLnBrk="1" latinLnBrk="0" hangingPunct="1">
-        <a:defRPr sz="1701" kern="1200">
+      <a:lvl3pPr marL="1219170" algn="l" defTabSz="1219170" rtl="0" eaLnBrk="1" latinLnBrk="0" hangingPunct="1">
+        <a:defRPr sz="2400" kern="1200">
           <a:solidFill>
             <a:schemeClr val="tx1"/>
           </a:solidFill>
@@ -3327,8 +3330,8 @@
           <a:cs typeface="+mn-cs"/>
         </a:defRPr>
       </a:lvl3pPr>
-      <a:lvl4pPr marL="1296025" algn="l" defTabSz="864017" rtl="0" eaLnBrk="1" latinLnBrk="0" hangingPunct="1">
-        <a:defRPr sz="1701" kern="1200">
+      <a:lvl4pPr marL="1828754" algn="l" defTabSz="1219170" rtl="0" eaLnBrk="1" latinLnBrk="0" hangingPunct="1">
+        <a:defRPr sz="2400" kern="1200">
           <a:solidFill>
             <a:schemeClr val="tx1"/>
           </a:solidFill>
@@ -3337,8 +3340,8 @@
           <a:cs typeface="+mn-cs"/>
         </a:defRPr>
       </a:lvl4pPr>
-      <a:lvl5pPr marL="1728033" algn="l" defTabSz="864017" rtl="0" eaLnBrk="1" latinLnBrk="0" hangingPunct="1">
-        <a:defRPr sz="1701" kern="1200">
+      <a:lvl5pPr marL="2438339" algn="l" defTabSz="1219170" rtl="0" eaLnBrk="1" latinLnBrk="0" hangingPunct="1">
+        <a:defRPr sz="2400" kern="1200">
           <a:solidFill>
             <a:schemeClr val="tx1"/>
           </a:solidFill>
@@ -3347,8 +3350,8 @@
           <a:cs typeface="+mn-cs"/>
         </a:defRPr>
       </a:lvl5pPr>
-      <a:lvl6pPr marL="2160041" algn="l" defTabSz="864017" rtl="0" eaLnBrk="1" latinLnBrk="0" hangingPunct="1">
-        <a:defRPr sz="1701" kern="1200">
+      <a:lvl6pPr marL="3047924" algn="l" defTabSz="1219170" rtl="0" eaLnBrk="1" latinLnBrk="0" hangingPunct="1">
+        <a:defRPr sz="2400" kern="1200">
           <a:solidFill>
             <a:schemeClr val="tx1"/>
           </a:solidFill>
@@ -3357,8 +3360,8 @@
           <a:cs typeface="+mn-cs"/>
         </a:defRPr>
       </a:lvl6pPr>
-      <a:lvl7pPr marL="2592050" algn="l" defTabSz="864017" rtl="0" eaLnBrk="1" latinLnBrk="0" hangingPunct="1">
-        <a:defRPr sz="1701" kern="1200">
+      <a:lvl7pPr marL="3657509" algn="l" defTabSz="1219170" rtl="0" eaLnBrk="1" latinLnBrk="0" hangingPunct="1">
+        <a:defRPr sz="2400" kern="1200">
           <a:solidFill>
             <a:schemeClr val="tx1"/>
           </a:solidFill>
@@ -3367,8 +3370,8 @@
           <a:cs typeface="+mn-cs"/>
         </a:defRPr>
       </a:lvl7pPr>
-      <a:lvl8pPr marL="3024058" algn="l" defTabSz="864017" rtl="0" eaLnBrk="1" latinLnBrk="0" hangingPunct="1">
-        <a:defRPr sz="1701" kern="1200">
+      <a:lvl8pPr marL="4267093" algn="l" defTabSz="1219170" rtl="0" eaLnBrk="1" latinLnBrk="0" hangingPunct="1">
+        <a:defRPr sz="2400" kern="1200">
           <a:solidFill>
             <a:schemeClr val="tx1"/>
           </a:solidFill>
@@ -3377,8 +3380,8 @@
           <a:cs typeface="+mn-cs"/>
         </a:defRPr>
       </a:lvl8pPr>
-      <a:lvl9pPr marL="3456066" algn="l" defTabSz="864017" rtl="0" eaLnBrk="1" latinLnBrk="0" hangingPunct="1">
-        <a:defRPr sz="1701" kern="1200">
+      <a:lvl9pPr marL="4876678" algn="l" defTabSz="1219170" rtl="0" eaLnBrk="1" latinLnBrk="0" hangingPunct="1">
+        <a:defRPr sz="2400" kern="1200">
           <a:solidFill>
             <a:schemeClr val="tx1"/>
           </a:solidFill>
@@ -3411,10 +3414,10 @@
       </p:grpSpPr>
       <p:pic>
         <p:nvPicPr>
-          <p:cNvPr id="5" name="Picture 4">
+          <p:cNvPr id="36" name="Picture 35">
             <a:extLst>
               <a:ext uri="{FF2B5EF4-FFF2-40B4-BE49-F238E27FC236}">
-                <a16:creationId xmlns:a16="http://schemas.microsoft.com/office/drawing/2014/main" id="{457959F5-2C2A-C06B-A4E3-02243063ACB5}"/>
+                <a16:creationId xmlns:a16="http://schemas.microsoft.com/office/drawing/2014/main" id="{0408BA4B-2F6B-3A1E-AAC1-208E82CAE0FF}"/>
               </a:ext>
             </a:extLst>
           </p:cNvPr>
@@ -3425,13 +3428,13 @@
         </p:nvPicPr>
         <p:blipFill rotWithShape="1">
           <a:blip r:embed="rId3"/>
-          <a:srcRect b="57069"/>
+          <a:srcRect b="56863"/>
           <a:stretch/>
         </p:blipFill>
         <p:spPr>
           <a:xfrm>
-            <a:off x="0" y="80853"/>
-            <a:ext cx="12192000" cy="2617075"/>
+            <a:off x="0" y="70367"/>
+            <a:ext cx="12165498" cy="2623930"/>
           </a:xfrm>
           <a:prstGeom prst="rect">
             <a:avLst/>
@@ -3440,10 +3443,10 @@
       </p:pic>
       <p:pic>
         <p:nvPicPr>
-          <p:cNvPr id="6" name="Picture 5">
+          <p:cNvPr id="37" name="Picture 36">
             <a:extLst>
               <a:ext uri="{FF2B5EF4-FFF2-40B4-BE49-F238E27FC236}">
-                <a16:creationId xmlns:a16="http://schemas.microsoft.com/office/drawing/2014/main" id="{D1218E91-03FA-B206-29CA-6ADEEA332D13}"/>
+                <a16:creationId xmlns:a16="http://schemas.microsoft.com/office/drawing/2014/main" id="{CAA113B5-9BDA-C947-BFD6-22DD9F20562F}"/>
               </a:ext>
             </a:extLst>
           </p:cNvPr>
@@ -3454,13 +3457,13 @@
         </p:nvPicPr>
         <p:blipFill rotWithShape="1">
           <a:blip r:embed="rId4"/>
-          <a:srcRect t="48578" b="8491"/>
+          <a:srcRect t="50000" b="8497"/>
           <a:stretch/>
         </p:blipFill>
         <p:spPr>
           <a:xfrm>
-            <a:off x="0" y="3128855"/>
-            <a:ext cx="12192000" cy="2617075"/>
+            <a:off x="0" y="3211066"/>
+            <a:ext cx="12165498" cy="2524539"/>
           </a:xfrm>
           <a:prstGeom prst="rect">
             <a:avLst/>
@@ -3469,10 +3472,10 @@
       </p:pic>
       <p:sp>
         <p:nvSpPr>
-          <p:cNvPr id="7" name="TextBox 6">
+          <p:cNvPr id="38" name="TextBox 37">
             <a:extLst>
               <a:ext uri="{FF2B5EF4-FFF2-40B4-BE49-F238E27FC236}">
-                <a16:creationId xmlns:a16="http://schemas.microsoft.com/office/drawing/2014/main" id="{C5744AF8-0923-D86B-6468-06C27DACC4C5}"/>
+                <a16:creationId xmlns:a16="http://schemas.microsoft.com/office/drawing/2014/main" id="{2F186A0F-2691-7F39-3D2B-E81C13A48157}"/>
               </a:ext>
             </a:extLst>
           </p:cNvPr>
@@ -3481,7 +3484,7 @@
         </p:nvSpPr>
         <p:spPr>
           <a:xfrm rot="19357041">
-            <a:off x="597653" y="5827014"/>
+            <a:off x="637409" y="5797993"/>
             <a:ext cx="670376" cy="276999"/>
           </a:xfrm>
           <a:prstGeom prst="rect">
@@ -3507,10 +3510,10 @@
       </p:sp>
       <p:sp>
         <p:nvSpPr>
-          <p:cNvPr id="8" name="TextBox 7">
+          <p:cNvPr id="39" name="TextBox 38">
             <a:extLst>
               <a:ext uri="{FF2B5EF4-FFF2-40B4-BE49-F238E27FC236}">
-                <a16:creationId xmlns:a16="http://schemas.microsoft.com/office/drawing/2014/main" id="{093361B2-FEA8-7942-DE06-8430C7B8BED6}"/>
+                <a16:creationId xmlns:a16="http://schemas.microsoft.com/office/drawing/2014/main" id="{608C694D-9FCA-ED1C-BE8A-17AC43CE8A69}"/>
               </a:ext>
             </a:extLst>
           </p:cNvPr>
@@ -3519,7 +3522,7 @@
         </p:nvSpPr>
         <p:spPr>
           <a:xfrm rot="19357041">
-            <a:off x="2200482" y="5827015"/>
+            <a:off x="2220360" y="5797994"/>
             <a:ext cx="670376" cy="276999"/>
           </a:xfrm>
           <a:prstGeom prst="rect">
@@ -3545,10 +3548,10 @@
       </p:sp>
       <p:sp>
         <p:nvSpPr>
-          <p:cNvPr id="9" name="TextBox 8">
+          <p:cNvPr id="40" name="TextBox 39">
             <a:extLst>
               <a:ext uri="{FF2B5EF4-FFF2-40B4-BE49-F238E27FC236}">
-                <a16:creationId xmlns:a16="http://schemas.microsoft.com/office/drawing/2014/main" id="{A50C9B34-52F8-05FB-F54E-049A649B37FD}"/>
+                <a16:creationId xmlns:a16="http://schemas.microsoft.com/office/drawing/2014/main" id="{D0549049-BBAC-43E0-76A9-5BCA6FA05F57}"/>
               </a:ext>
             </a:extLst>
           </p:cNvPr>
@@ -3557,7 +3560,7 @@
         </p:nvSpPr>
         <p:spPr>
           <a:xfrm rot="19357041">
-            <a:off x="4061078" y="5817281"/>
+            <a:off x="4080956" y="5788260"/>
             <a:ext cx="638316" cy="276999"/>
           </a:xfrm>
           <a:prstGeom prst="rect">
@@ -3583,10 +3586,10 @@
       </p:sp>
       <p:sp>
         <p:nvSpPr>
-          <p:cNvPr id="10" name="TextBox 9">
+          <p:cNvPr id="41" name="TextBox 40">
             <a:extLst>
               <a:ext uri="{FF2B5EF4-FFF2-40B4-BE49-F238E27FC236}">
-                <a16:creationId xmlns:a16="http://schemas.microsoft.com/office/drawing/2014/main" id="{5ED38FAA-3FFE-0FCA-EBE8-B0B1DA035354}"/>
+                <a16:creationId xmlns:a16="http://schemas.microsoft.com/office/drawing/2014/main" id="{D9D8FB72-2379-C5AE-43FB-48C6DC16977D}"/>
               </a:ext>
             </a:extLst>
           </p:cNvPr>
@@ -3595,7 +3598,7 @@
         </p:nvSpPr>
         <p:spPr>
           <a:xfrm rot="19357041">
-            <a:off x="5674416" y="5817281"/>
+            <a:off x="5674416" y="5788260"/>
             <a:ext cx="638316" cy="276999"/>
           </a:xfrm>
           <a:prstGeom prst="rect">
@@ -3621,10 +3624,10 @@
       </p:sp>
       <p:sp>
         <p:nvSpPr>
-          <p:cNvPr id="11" name="TextBox 10">
+          <p:cNvPr id="42" name="TextBox 41">
             <a:extLst>
               <a:ext uri="{FF2B5EF4-FFF2-40B4-BE49-F238E27FC236}">
-                <a16:creationId xmlns:a16="http://schemas.microsoft.com/office/drawing/2014/main" id="{DBC703E8-76CE-F002-85D4-33F99344549C}"/>
+                <a16:creationId xmlns:a16="http://schemas.microsoft.com/office/drawing/2014/main" id="{1D16B44E-55C0-A296-69A1-292A023BF9DD}"/>
               </a:ext>
             </a:extLst>
           </p:cNvPr>
@@ -3633,7 +3636,7 @@
         </p:nvSpPr>
         <p:spPr>
           <a:xfrm rot="19357041">
-            <a:off x="7639586" y="5827015"/>
+            <a:off x="7639586" y="5797994"/>
             <a:ext cx="670376" cy="276999"/>
           </a:xfrm>
           <a:prstGeom prst="rect">
@@ -3659,10 +3662,10 @@
       </p:sp>
       <p:sp>
         <p:nvSpPr>
-          <p:cNvPr id="12" name="TextBox 11">
+          <p:cNvPr id="44" name="TextBox 43">
             <a:extLst>
               <a:ext uri="{FF2B5EF4-FFF2-40B4-BE49-F238E27FC236}">
-                <a16:creationId xmlns:a16="http://schemas.microsoft.com/office/drawing/2014/main" id="{1A624E57-D188-BB70-F395-4FD99FBE2AEF}"/>
+                <a16:creationId xmlns:a16="http://schemas.microsoft.com/office/drawing/2014/main" id="{1723BD7A-D213-660E-C343-D284E4A003BD}"/>
               </a:ext>
             </a:extLst>
           </p:cNvPr>
@@ -3671,7 +3674,1279 @@
         </p:nvSpPr>
         <p:spPr>
           <a:xfrm>
-            <a:off x="714704" y="6123385"/>
+            <a:off x="9761085" y="5701145"/>
+            <a:ext cx="620683" cy="276999"/>
+          </a:xfrm>
+          <a:prstGeom prst="rect">
+            <a:avLst/>
+          </a:prstGeom>
+          <a:noFill/>
+        </p:spPr>
+        <p:txBody>
+          <a:bodyPr wrap="none" rtlCol="0">
+            <a:spAutoFit/>
+          </a:bodyPr>
+          <a:lstStyle/>
+          <a:p>
+            <a:r>
+              <a:rPr lang="en-GB" sz="1200" dirty="0">
+                <a:latin typeface="Arial" panose="020B0604020202020204" pitchFamily="34" charset="0"/>
+                <a:cs typeface="Arial" panose="020B0604020202020204" pitchFamily="34" charset="0"/>
+              </a:rPr>
+              <a:t>Forest</a:t>
+            </a:r>
+          </a:p>
+        </p:txBody>
+      </p:sp>
+      <p:sp>
+        <p:nvSpPr>
+          <p:cNvPr id="45" name="TextBox 44">
+            <a:extLst>
+              <a:ext uri="{FF2B5EF4-FFF2-40B4-BE49-F238E27FC236}">
+                <a16:creationId xmlns:a16="http://schemas.microsoft.com/office/drawing/2014/main" id="{C75B418D-342D-E648-841E-DDDC4FD310A6}"/>
+              </a:ext>
+            </a:extLst>
+          </p:cNvPr>
+          <p:cNvSpPr txBox="1"/>
+          <p:nvPr/>
+        </p:nvSpPr>
+        <p:spPr>
+          <a:xfrm>
+            <a:off x="10829069" y="5701145"/>
+            <a:ext cx="915635" cy="276999"/>
+          </a:xfrm>
+          <a:prstGeom prst="rect">
+            <a:avLst/>
+          </a:prstGeom>
+          <a:noFill/>
+        </p:spPr>
+        <p:txBody>
+          <a:bodyPr wrap="none" rtlCol="0">
+            <a:spAutoFit/>
+          </a:bodyPr>
+          <a:lstStyle/>
+          <a:p>
+            <a:r>
+              <a:rPr lang="en-GB" sz="1200" dirty="0">
+                <a:latin typeface="Arial" panose="020B0604020202020204" pitchFamily="34" charset="0"/>
+                <a:cs typeface="Arial" panose="020B0604020202020204" pitchFamily="34" charset="0"/>
+              </a:rPr>
+              <a:t>Developed</a:t>
+            </a:r>
+          </a:p>
+        </p:txBody>
+      </p:sp>
+      <p:sp>
+        <p:nvSpPr>
+          <p:cNvPr id="46" name="TextBox 45">
+            <a:extLst>
+              <a:ext uri="{FF2B5EF4-FFF2-40B4-BE49-F238E27FC236}">
+                <a16:creationId xmlns:a16="http://schemas.microsoft.com/office/drawing/2014/main" id="{75A07841-7540-EEFF-D048-6A65C754272D}"/>
+              </a:ext>
+            </a:extLst>
+          </p:cNvPr>
+          <p:cNvSpPr txBox="1"/>
+          <p:nvPr/>
+        </p:nvSpPr>
+        <p:spPr>
+          <a:xfrm>
+            <a:off x="9312171" y="5915125"/>
+            <a:ext cx="2722179" cy="307777"/>
+          </a:xfrm>
+          <a:prstGeom prst="rect">
+            <a:avLst/>
+          </a:prstGeom>
+          <a:noFill/>
+        </p:spPr>
+        <p:txBody>
+          <a:bodyPr wrap="square" rtlCol="0">
+            <a:spAutoFit/>
+          </a:bodyPr>
+          <a:lstStyle/>
+          <a:p>
+            <a:pPr algn="ctr"/>
+            <a:r>
+              <a:rPr lang="en-GB" sz="1400" b="1" dirty="0">
+                <a:latin typeface="Arial" panose="020B0604020202020204" pitchFamily="34" charset="0"/>
+                <a:cs typeface="Arial" panose="020B0604020202020204" pitchFamily="34" charset="0"/>
+              </a:rPr>
+              <a:t>Land use </a:t>
+            </a:r>
+          </a:p>
+        </p:txBody>
+      </p:sp>
+      <p:sp>
+        <p:nvSpPr>
+          <p:cNvPr id="47" name="TextBox 46">
+            <a:extLst>
+              <a:ext uri="{FF2B5EF4-FFF2-40B4-BE49-F238E27FC236}">
+                <a16:creationId xmlns:a16="http://schemas.microsoft.com/office/drawing/2014/main" id="{D331D623-ACC2-F1D1-AADA-976F02D67835}"/>
+              </a:ext>
+            </a:extLst>
+          </p:cNvPr>
+          <p:cNvSpPr txBox="1"/>
+          <p:nvPr/>
+        </p:nvSpPr>
+        <p:spPr>
+          <a:xfrm rot="16200000">
+            <a:off x="-1089463" y="4279710"/>
+            <a:ext cx="2566623" cy="307777"/>
+          </a:xfrm>
+          <a:prstGeom prst="rect">
+            <a:avLst/>
+          </a:prstGeom>
+          <a:solidFill>
+            <a:srgbClr val="FFFFFF"/>
+          </a:solidFill>
+        </p:spPr>
+        <p:txBody>
+          <a:bodyPr wrap="square" rtlCol="0">
+            <a:spAutoFit/>
+          </a:bodyPr>
+          <a:lstStyle/>
+          <a:p>
+            <a:pPr algn="ctr"/>
+            <a:r>
+              <a:rPr lang="en-GB" sz="1400" b="1" dirty="0">
+                <a:latin typeface="Arial" panose="020B0604020202020204" pitchFamily="34" charset="0"/>
+                <a:cs typeface="Arial" panose="020B0604020202020204" pitchFamily="34" charset="0"/>
+              </a:rPr>
+              <a:t>Spatial variability of </a:t>
+            </a:r>
+            <a:r>
+              <a:rPr lang="en-GB" sz="1400" b="1" dirty="0" err="1">
+                <a:latin typeface="Arial" panose="020B0604020202020204" pitchFamily="34" charset="0"/>
+                <a:cs typeface="Arial" panose="020B0604020202020204" pitchFamily="34" charset="0"/>
+              </a:rPr>
+              <a:t>NDSI</a:t>
+            </a:r>
+            <a:r>
+              <a:rPr lang="en-GB" sz="1400" b="1" baseline="-25000" dirty="0" err="1">
+                <a:latin typeface="Arial" panose="020B0604020202020204" pitchFamily="34" charset="0"/>
+                <a:cs typeface="Arial" panose="020B0604020202020204" pitchFamily="34" charset="0"/>
+              </a:rPr>
+              <a:t>Bio</a:t>
+            </a:r>
+            <a:endParaRPr lang="en-GB" sz="1400" b="1" dirty="0">
+              <a:latin typeface="Arial" panose="020B0604020202020204" pitchFamily="34" charset="0"/>
+              <a:cs typeface="Arial" panose="020B0604020202020204" pitchFamily="34" charset="0"/>
+            </a:endParaRPr>
+          </a:p>
+        </p:txBody>
+      </p:sp>
+      <p:sp>
+        <p:nvSpPr>
+          <p:cNvPr id="48" name="TextBox 47">
+            <a:extLst>
+              <a:ext uri="{FF2B5EF4-FFF2-40B4-BE49-F238E27FC236}">
+                <a16:creationId xmlns:a16="http://schemas.microsoft.com/office/drawing/2014/main" id="{2B3A44DB-4E6D-0F89-96C4-159B9F35489B}"/>
+              </a:ext>
+            </a:extLst>
+          </p:cNvPr>
+          <p:cNvSpPr txBox="1"/>
+          <p:nvPr/>
+        </p:nvSpPr>
+        <p:spPr>
+          <a:xfrm rot="16200000">
+            <a:off x="-1105365" y="1349802"/>
+            <a:ext cx="2602786" cy="307777"/>
+          </a:xfrm>
+          <a:prstGeom prst="rect">
+            <a:avLst/>
+          </a:prstGeom>
+          <a:solidFill>
+            <a:srgbClr val="FFFFFF"/>
+          </a:solidFill>
+        </p:spPr>
+        <p:txBody>
+          <a:bodyPr wrap="square" rtlCol="0">
+            <a:spAutoFit/>
+          </a:bodyPr>
+          <a:lstStyle/>
+          <a:p>
+            <a:pPr algn="ctr"/>
+            <a:r>
+              <a:rPr lang="en-GB" sz="1400" b="1" dirty="0">
+                <a:latin typeface="Arial" panose="020B0604020202020204" pitchFamily="34" charset="0"/>
+                <a:cs typeface="Arial" panose="020B0604020202020204" pitchFamily="34" charset="0"/>
+              </a:rPr>
+              <a:t>Spatial variability of </a:t>
+            </a:r>
+            <a:r>
+              <a:rPr lang="en-GB" sz="1400" b="1" dirty="0" err="1">
+                <a:latin typeface="Arial" panose="020B0604020202020204" pitchFamily="34" charset="0"/>
+                <a:cs typeface="Arial" panose="020B0604020202020204" pitchFamily="34" charset="0"/>
+              </a:rPr>
+              <a:t>NDSI</a:t>
+            </a:r>
+            <a:r>
+              <a:rPr lang="en-GB" sz="1400" b="1" baseline="-25000" dirty="0" err="1">
+                <a:latin typeface="Arial" panose="020B0604020202020204" pitchFamily="34" charset="0"/>
+                <a:cs typeface="Arial" panose="020B0604020202020204" pitchFamily="34" charset="0"/>
+              </a:rPr>
+              <a:t>Bio</a:t>
+            </a:r>
+            <a:endParaRPr lang="en-GB" sz="1400" b="1" baseline="-25000" dirty="0">
+              <a:latin typeface="Arial" panose="020B0604020202020204" pitchFamily="34" charset="0"/>
+              <a:cs typeface="Arial" panose="020B0604020202020204" pitchFamily="34" charset="0"/>
+            </a:endParaRPr>
+          </a:p>
+        </p:txBody>
+      </p:sp>
+      <p:sp>
+        <p:nvSpPr>
+          <p:cNvPr id="49" name="TextBox 48">
+            <a:extLst>
+              <a:ext uri="{FF2B5EF4-FFF2-40B4-BE49-F238E27FC236}">
+                <a16:creationId xmlns:a16="http://schemas.microsoft.com/office/drawing/2014/main" id="{3FC8100C-1D92-FC1C-7607-5C1E9540A5CB}"/>
+              </a:ext>
+            </a:extLst>
+          </p:cNvPr>
+          <p:cNvSpPr txBox="1"/>
+          <p:nvPr/>
+        </p:nvSpPr>
+        <p:spPr>
+          <a:xfrm>
+            <a:off x="9564419" y="2648232"/>
+            <a:ext cx="1019503" cy="276999"/>
+          </a:xfrm>
+          <a:prstGeom prst="rect">
+            <a:avLst/>
+          </a:prstGeom>
+          <a:noFill/>
+        </p:spPr>
+        <p:txBody>
+          <a:bodyPr wrap="square" rtlCol="0">
+            <a:spAutoFit/>
+          </a:bodyPr>
+          <a:lstStyle/>
+          <a:p>
+            <a:pPr algn="ctr"/>
+            <a:r>
+              <a:rPr lang="en-GB" sz="1200" dirty="0">
+                <a:latin typeface="Arial" panose="020B0604020202020204" pitchFamily="34" charset="0"/>
+                <a:cs typeface="Arial" panose="020B0604020202020204" pitchFamily="34" charset="0"/>
+              </a:rPr>
+              <a:t>Pre-typhoon</a:t>
+            </a:r>
+          </a:p>
+        </p:txBody>
+      </p:sp>
+      <p:sp>
+        <p:nvSpPr>
+          <p:cNvPr id="50" name="TextBox 49">
+            <a:extLst>
+              <a:ext uri="{FF2B5EF4-FFF2-40B4-BE49-F238E27FC236}">
+                <a16:creationId xmlns:a16="http://schemas.microsoft.com/office/drawing/2014/main" id="{57F0AB03-D02A-ABAE-2E8B-276DA475D720}"/>
+              </a:ext>
+            </a:extLst>
+          </p:cNvPr>
+          <p:cNvSpPr txBox="1"/>
+          <p:nvPr/>
+        </p:nvSpPr>
+        <p:spPr>
+          <a:xfrm>
+            <a:off x="10755494" y="2648232"/>
+            <a:ext cx="1088760" cy="276999"/>
+          </a:xfrm>
+          <a:prstGeom prst="rect">
+            <a:avLst/>
+          </a:prstGeom>
+          <a:noFill/>
+        </p:spPr>
+        <p:txBody>
+          <a:bodyPr wrap="none" rtlCol="0">
+            <a:spAutoFit/>
+          </a:bodyPr>
+          <a:lstStyle/>
+          <a:p>
+            <a:pPr algn="ctr"/>
+            <a:r>
+              <a:rPr lang="en-GB" sz="1200" dirty="0">
+                <a:latin typeface="Arial" panose="020B0604020202020204" pitchFamily="34" charset="0"/>
+                <a:cs typeface="Arial" panose="020B0604020202020204" pitchFamily="34" charset="0"/>
+              </a:rPr>
+              <a:t>Post-typhoon</a:t>
+            </a:r>
+          </a:p>
+        </p:txBody>
+      </p:sp>
+      <p:sp>
+        <p:nvSpPr>
+          <p:cNvPr id="51" name="TextBox 50">
+            <a:extLst>
+              <a:ext uri="{FF2B5EF4-FFF2-40B4-BE49-F238E27FC236}">
+                <a16:creationId xmlns:a16="http://schemas.microsoft.com/office/drawing/2014/main" id="{50938F98-A476-D306-18A0-5B9857670316}"/>
+              </a:ext>
+            </a:extLst>
+          </p:cNvPr>
+          <p:cNvSpPr txBox="1"/>
+          <p:nvPr/>
+        </p:nvSpPr>
+        <p:spPr>
+          <a:xfrm>
+            <a:off x="9312171" y="2909417"/>
+            <a:ext cx="2722179" cy="307777"/>
+          </a:xfrm>
+          <a:prstGeom prst="rect">
+            <a:avLst/>
+          </a:prstGeom>
+          <a:noFill/>
+        </p:spPr>
+        <p:txBody>
+          <a:bodyPr wrap="square" rtlCol="0">
+            <a:spAutoFit/>
+          </a:bodyPr>
+          <a:lstStyle/>
+          <a:p>
+            <a:pPr algn="ctr"/>
+            <a:r>
+              <a:rPr lang="en-GB" sz="1400" b="1" dirty="0">
+                <a:latin typeface="Arial" panose="020B0604020202020204" pitchFamily="34" charset="0"/>
+                <a:cs typeface="Arial" panose="020B0604020202020204" pitchFamily="34" charset="0"/>
+              </a:rPr>
+              <a:t>Time period</a:t>
+            </a:r>
+          </a:p>
+        </p:txBody>
+      </p:sp>
+      <p:sp>
+        <p:nvSpPr>
+          <p:cNvPr id="52" name="TextBox 51">
+            <a:extLst>
+              <a:ext uri="{FF2B5EF4-FFF2-40B4-BE49-F238E27FC236}">
+                <a16:creationId xmlns:a16="http://schemas.microsoft.com/office/drawing/2014/main" id="{4A97F3FE-C535-3B78-AD02-C227E232A612}"/>
+              </a:ext>
+            </a:extLst>
+          </p:cNvPr>
+          <p:cNvSpPr txBox="1"/>
+          <p:nvPr/>
+        </p:nvSpPr>
+        <p:spPr>
+          <a:xfrm rot="19357041">
+            <a:off x="637409" y="2753001"/>
+            <a:ext cx="670376" cy="276999"/>
+          </a:xfrm>
+          <a:prstGeom prst="rect">
+            <a:avLst/>
+          </a:prstGeom>
+          <a:noFill/>
+        </p:spPr>
+        <p:txBody>
+          <a:bodyPr wrap="none" rtlCol="0">
+            <a:spAutoFit/>
+          </a:bodyPr>
+          <a:lstStyle/>
+          <a:p>
+            <a:r>
+              <a:rPr lang="en-GB" sz="1200" dirty="0">
+                <a:latin typeface="Arial" panose="020B0604020202020204" pitchFamily="34" charset="0"/>
+                <a:cs typeface="Arial" panose="020B0604020202020204" pitchFamily="34" charset="0"/>
+              </a:rPr>
+              <a:t>Sep 01</a:t>
+            </a:r>
+          </a:p>
+        </p:txBody>
+      </p:sp>
+      <p:sp>
+        <p:nvSpPr>
+          <p:cNvPr id="53" name="TextBox 52">
+            <a:extLst>
+              <a:ext uri="{FF2B5EF4-FFF2-40B4-BE49-F238E27FC236}">
+                <a16:creationId xmlns:a16="http://schemas.microsoft.com/office/drawing/2014/main" id="{0EF2682B-94FC-A175-CAF2-0EB542F6C5E3}"/>
+              </a:ext>
+            </a:extLst>
+          </p:cNvPr>
+          <p:cNvSpPr txBox="1"/>
+          <p:nvPr/>
+        </p:nvSpPr>
+        <p:spPr>
+          <a:xfrm rot="19357041">
+            <a:off x="2220360" y="2753002"/>
+            <a:ext cx="670376" cy="276999"/>
+          </a:xfrm>
+          <a:prstGeom prst="rect">
+            <a:avLst/>
+          </a:prstGeom>
+          <a:noFill/>
+        </p:spPr>
+        <p:txBody>
+          <a:bodyPr wrap="none" rtlCol="0">
+            <a:spAutoFit/>
+          </a:bodyPr>
+          <a:lstStyle/>
+          <a:p>
+            <a:r>
+              <a:rPr lang="en-GB" sz="1200" dirty="0">
+                <a:latin typeface="Arial" panose="020B0604020202020204" pitchFamily="34" charset="0"/>
+                <a:cs typeface="Arial" panose="020B0604020202020204" pitchFamily="34" charset="0"/>
+              </a:rPr>
+              <a:t>Sep 15</a:t>
+            </a:r>
+          </a:p>
+        </p:txBody>
+      </p:sp>
+      <p:sp>
+        <p:nvSpPr>
+          <p:cNvPr id="54" name="TextBox 53">
+            <a:extLst>
+              <a:ext uri="{FF2B5EF4-FFF2-40B4-BE49-F238E27FC236}">
+                <a16:creationId xmlns:a16="http://schemas.microsoft.com/office/drawing/2014/main" id="{7A6FC9FD-55F4-CDCB-E3F6-DFE8790C44A1}"/>
+              </a:ext>
+            </a:extLst>
+          </p:cNvPr>
+          <p:cNvSpPr txBox="1"/>
+          <p:nvPr/>
+        </p:nvSpPr>
+        <p:spPr>
+          <a:xfrm rot="19357041">
+            <a:off x="4080956" y="2743268"/>
+            <a:ext cx="638316" cy="276999"/>
+          </a:xfrm>
+          <a:prstGeom prst="rect">
+            <a:avLst/>
+          </a:prstGeom>
+          <a:noFill/>
+        </p:spPr>
+        <p:txBody>
+          <a:bodyPr wrap="none" rtlCol="0">
+            <a:spAutoFit/>
+          </a:bodyPr>
+          <a:lstStyle/>
+          <a:p>
+            <a:r>
+              <a:rPr lang="en-GB" sz="1200" dirty="0">
+                <a:latin typeface="Arial" panose="020B0604020202020204" pitchFamily="34" charset="0"/>
+                <a:cs typeface="Arial" panose="020B0604020202020204" pitchFamily="34" charset="0"/>
+              </a:rPr>
+              <a:t>Oct 01</a:t>
+            </a:r>
+          </a:p>
+        </p:txBody>
+      </p:sp>
+      <p:sp>
+        <p:nvSpPr>
+          <p:cNvPr id="55" name="TextBox 54">
+            <a:extLst>
+              <a:ext uri="{FF2B5EF4-FFF2-40B4-BE49-F238E27FC236}">
+                <a16:creationId xmlns:a16="http://schemas.microsoft.com/office/drawing/2014/main" id="{5FA17ECB-6AE1-0C33-7EF1-CE23590A3BC0}"/>
+              </a:ext>
+            </a:extLst>
+          </p:cNvPr>
+          <p:cNvSpPr txBox="1"/>
+          <p:nvPr/>
+        </p:nvSpPr>
+        <p:spPr>
+          <a:xfrm rot="19357041">
+            <a:off x="5674416" y="2743268"/>
+            <a:ext cx="638316" cy="276999"/>
+          </a:xfrm>
+          <a:prstGeom prst="rect">
+            <a:avLst/>
+          </a:prstGeom>
+          <a:noFill/>
+        </p:spPr>
+        <p:txBody>
+          <a:bodyPr wrap="none" rtlCol="0">
+            <a:spAutoFit/>
+          </a:bodyPr>
+          <a:lstStyle/>
+          <a:p>
+            <a:r>
+              <a:rPr lang="en-GB" sz="1200" dirty="0">
+                <a:latin typeface="Arial" panose="020B0604020202020204" pitchFamily="34" charset="0"/>
+                <a:cs typeface="Arial" panose="020B0604020202020204" pitchFamily="34" charset="0"/>
+              </a:rPr>
+              <a:t>Oct 15</a:t>
+            </a:r>
+          </a:p>
+        </p:txBody>
+      </p:sp>
+      <p:sp>
+        <p:nvSpPr>
+          <p:cNvPr id="56" name="TextBox 55">
+            <a:extLst>
+              <a:ext uri="{FF2B5EF4-FFF2-40B4-BE49-F238E27FC236}">
+                <a16:creationId xmlns:a16="http://schemas.microsoft.com/office/drawing/2014/main" id="{04DB1CAD-A5E4-F7FB-F091-DDCA891145DB}"/>
+              </a:ext>
+            </a:extLst>
+          </p:cNvPr>
+          <p:cNvSpPr txBox="1"/>
+          <p:nvPr/>
+        </p:nvSpPr>
+        <p:spPr>
+          <a:xfrm rot="19357041">
+            <a:off x="7639586" y="2753002"/>
+            <a:ext cx="670376" cy="276999"/>
+          </a:xfrm>
+          <a:prstGeom prst="rect">
+            <a:avLst/>
+          </a:prstGeom>
+          <a:noFill/>
+        </p:spPr>
+        <p:txBody>
+          <a:bodyPr wrap="none" rtlCol="0">
+            <a:spAutoFit/>
+          </a:bodyPr>
+          <a:lstStyle/>
+          <a:p>
+            <a:r>
+              <a:rPr lang="en-GB" sz="1200" dirty="0">
+                <a:latin typeface="Arial" panose="020B0604020202020204" pitchFamily="34" charset="0"/>
+                <a:cs typeface="Arial" panose="020B0604020202020204" pitchFamily="34" charset="0"/>
+              </a:rPr>
+              <a:t>Nov 01</a:t>
+            </a:r>
+          </a:p>
+        </p:txBody>
+      </p:sp>
+      <p:sp>
+        <p:nvSpPr>
+          <p:cNvPr id="57" name="TextBox 56">
+            <a:extLst>
+              <a:ext uri="{FF2B5EF4-FFF2-40B4-BE49-F238E27FC236}">
+                <a16:creationId xmlns:a16="http://schemas.microsoft.com/office/drawing/2014/main" id="{6128BDAD-E5AF-687C-FF1D-0F50D3376D7D}"/>
+              </a:ext>
+            </a:extLst>
+          </p:cNvPr>
+          <p:cNvSpPr txBox="1"/>
+          <p:nvPr/>
+        </p:nvSpPr>
+        <p:spPr>
+          <a:xfrm>
+            <a:off x="972597" y="4368525"/>
+            <a:ext cx="654346" cy="276999"/>
+          </a:xfrm>
+          <a:prstGeom prst="rect">
+            <a:avLst/>
+          </a:prstGeom>
+          <a:noFill/>
+        </p:spPr>
+        <p:txBody>
+          <a:bodyPr wrap="none" rtlCol="0">
+            <a:spAutoFit/>
+          </a:bodyPr>
+          <a:lstStyle/>
+          <a:p>
+            <a:r>
+              <a:rPr lang="en-GB" sz="1200" b="1" dirty="0">
+                <a:latin typeface="Arial" panose="020B0604020202020204" pitchFamily="34" charset="0"/>
+                <a:cs typeface="Arial" panose="020B0604020202020204" pitchFamily="34" charset="0"/>
+              </a:rPr>
+              <a:t>Forest</a:t>
+            </a:r>
+          </a:p>
+        </p:txBody>
+      </p:sp>
+      <p:sp>
+        <p:nvSpPr>
+          <p:cNvPr id="58" name="TextBox 57">
+            <a:extLst>
+              <a:ext uri="{FF2B5EF4-FFF2-40B4-BE49-F238E27FC236}">
+                <a16:creationId xmlns:a16="http://schemas.microsoft.com/office/drawing/2014/main" id="{71E7D133-0AE4-24AF-9DE2-D9E0613724B7}"/>
+              </a:ext>
+            </a:extLst>
+          </p:cNvPr>
+          <p:cNvSpPr txBox="1"/>
+          <p:nvPr/>
+        </p:nvSpPr>
+        <p:spPr>
+          <a:xfrm>
+            <a:off x="972600" y="4931993"/>
+            <a:ext cx="962123" cy="276999"/>
+          </a:xfrm>
+          <a:prstGeom prst="rect">
+            <a:avLst/>
+          </a:prstGeom>
+          <a:noFill/>
+        </p:spPr>
+        <p:txBody>
+          <a:bodyPr wrap="none" rtlCol="0">
+            <a:spAutoFit/>
+          </a:bodyPr>
+          <a:lstStyle/>
+          <a:p>
+            <a:r>
+              <a:rPr lang="en-GB" sz="1200" b="1" dirty="0">
+                <a:latin typeface="Arial" panose="020B0604020202020204" pitchFamily="34" charset="0"/>
+                <a:cs typeface="Arial" panose="020B0604020202020204" pitchFamily="34" charset="0"/>
+              </a:rPr>
+              <a:t>Developed</a:t>
+            </a:r>
+          </a:p>
+        </p:txBody>
+      </p:sp>
+      <p:sp>
+        <p:nvSpPr>
+          <p:cNvPr id="59" name="TextBox 58">
+            <a:extLst>
+              <a:ext uri="{FF2B5EF4-FFF2-40B4-BE49-F238E27FC236}">
+                <a16:creationId xmlns:a16="http://schemas.microsoft.com/office/drawing/2014/main" id="{88BE4ECE-2986-BC64-2E66-03E05EB16857}"/>
+              </a:ext>
+            </a:extLst>
+          </p:cNvPr>
+          <p:cNvSpPr txBox="1"/>
+          <p:nvPr/>
+        </p:nvSpPr>
+        <p:spPr>
+          <a:xfrm>
+            <a:off x="754460" y="202295"/>
+            <a:ext cx="436338" cy="338554"/>
+          </a:xfrm>
+          <a:prstGeom prst="rect">
+            <a:avLst/>
+          </a:prstGeom>
+          <a:noFill/>
+        </p:spPr>
+        <p:txBody>
+          <a:bodyPr wrap="none" rtlCol="0">
+            <a:spAutoFit/>
+          </a:bodyPr>
+          <a:lstStyle/>
+          <a:p>
+            <a:r>
+              <a:rPr lang="en-GB" sz="1600" dirty="0">
+                <a:latin typeface="Arial" panose="020B0604020202020204" pitchFamily="34" charset="0"/>
+                <a:cs typeface="Arial" panose="020B0604020202020204" pitchFamily="34" charset="0"/>
+              </a:rPr>
+              <a:t>(a)</a:t>
+            </a:r>
+          </a:p>
+        </p:txBody>
+      </p:sp>
+      <p:sp>
+        <p:nvSpPr>
+          <p:cNvPr id="60" name="TextBox 59">
+            <a:extLst>
+              <a:ext uri="{FF2B5EF4-FFF2-40B4-BE49-F238E27FC236}">
+                <a16:creationId xmlns:a16="http://schemas.microsoft.com/office/drawing/2014/main" id="{D9FE8818-1EEB-E433-C001-5F137B8D5E9B}"/>
+              </a:ext>
+            </a:extLst>
+          </p:cNvPr>
+          <p:cNvSpPr txBox="1"/>
+          <p:nvPr/>
+        </p:nvSpPr>
+        <p:spPr>
+          <a:xfrm>
+            <a:off x="754460" y="3259895"/>
+            <a:ext cx="436338" cy="338554"/>
+          </a:xfrm>
+          <a:prstGeom prst="rect">
+            <a:avLst/>
+          </a:prstGeom>
+          <a:noFill/>
+        </p:spPr>
+        <p:txBody>
+          <a:bodyPr wrap="none" rtlCol="0">
+            <a:spAutoFit/>
+          </a:bodyPr>
+          <a:lstStyle/>
+          <a:p>
+            <a:r>
+              <a:rPr lang="en-GB" sz="1600" dirty="0">
+                <a:latin typeface="Arial" panose="020B0604020202020204" pitchFamily="34" charset="0"/>
+                <a:cs typeface="Arial" panose="020B0604020202020204" pitchFamily="34" charset="0"/>
+              </a:rPr>
+              <a:t>(b)</a:t>
+            </a:r>
+          </a:p>
+        </p:txBody>
+      </p:sp>
+      <p:sp>
+        <p:nvSpPr>
+          <p:cNvPr id="61" name="TextBox 60">
+            <a:extLst>
+              <a:ext uri="{FF2B5EF4-FFF2-40B4-BE49-F238E27FC236}">
+                <a16:creationId xmlns:a16="http://schemas.microsoft.com/office/drawing/2014/main" id="{E51F2CE0-0770-8F13-689B-2AE1E9DE14EB}"/>
+              </a:ext>
+            </a:extLst>
+          </p:cNvPr>
+          <p:cNvSpPr txBox="1"/>
+          <p:nvPr/>
+        </p:nvSpPr>
+        <p:spPr>
+          <a:xfrm>
+            <a:off x="9927393" y="1618488"/>
+            <a:ext cx="298480" cy="338554"/>
+          </a:xfrm>
+          <a:prstGeom prst="rect">
+            <a:avLst/>
+          </a:prstGeom>
+          <a:noFill/>
+        </p:spPr>
+        <p:txBody>
+          <a:bodyPr wrap="none" rtlCol="0">
+            <a:spAutoFit/>
+          </a:bodyPr>
+          <a:lstStyle/>
+          <a:p>
+            <a:r>
+              <a:rPr lang="en-GB" sz="1600" dirty="0">
+                <a:latin typeface="Arial" panose="020B0604020202020204" pitchFamily="34" charset="0"/>
+                <a:cs typeface="Arial" panose="020B0604020202020204" pitchFamily="34" charset="0"/>
+              </a:rPr>
+              <a:t>a</a:t>
+            </a:r>
+          </a:p>
+        </p:txBody>
+      </p:sp>
+      <p:sp>
+        <p:nvSpPr>
+          <p:cNvPr id="62" name="TextBox 61">
+            <a:extLst>
+              <a:ext uri="{FF2B5EF4-FFF2-40B4-BE49-F238E27FC236}">
+                <a16:creationId xmlns:a16="http://schemas.microsoft.com/office/drawing/2014/main" id="{D482654D-2EE2-33E5-A7C3-2F7955EC9B62}"/>
+              </a:ext>
+            </a:extLst>
+          </p:cNvPr>
+          <p:cNvSpPr txBox="1"/>
+          <p:nvPr/>
+        </p:nvSpPr>
+        <p:spPr>
+          <a:xfrm>
+            <a:off x="11140695" y="109851"/>
+            <a:ext cx="298480" cy="338554"/>
+          </a:xfrm>
+          <a:prstGeom prst="rect">
+            <a:avLst/>
+          </a:prstGeom>
+          <a:noFill/>
+        </p:spPr>
+        <p:txBody>
+          <a:bodyPr wrap="none" rtlCol="0">
+            <a:spAutoFit/>
+          </a:bodyPr>
+          <a:lstStyle/>
+          <a:p>
+            <a:r>
+              <a:rPr lang="en-GB" sz="1600" dirty="0">
+                <a:latin typeface="Arial" panose="020B0604020202020204" pitchFamily="34" charset="0"/>
+                <a:cs typeface="Arial" panose="020B0604020202020204" pitchFamily="34" charset="0"/>
+              </a:rPr>
+              <a:t>b</a:t>
+            </a:r>
+          </a:p>
+        </p:txBody>
+      </p:sp>
+      <p:sp>
+        <p:nvSpPr>
+          <p:cNvPr id="63" name="TextBox 62">
+            <a:extLst>
+              <a:ext uri="{FF2B5EF4-FFF2-40B4-BE49-F238E27FC236}">
+                <a16:creationId xmlns:a16="http://schemas.microsoft.com/office/drawing/2014/main" id="{4638F1F6-6B78-9C2F-0775-2FDA81E67D4C}"/>
+              </a:ext>
+            </a:extLst>
+          </p:cNvPr>
+          <p:cNvSpPr txBox="1"/>
+          <p:nvPr/>
+        </p:nvSpPr>
+        <p:spPr>
+          <a:xfrm>
+            <a:off x="9716697" y="4112378"/>
+            <a:ext cx="298480" cy="338554"/>
+          </a:xfrm>
+          <a:prstGeom prst="rect">
+            <a:avLst/>
+          </a:prstGeom>
+          <a:noFill/>
+        </p:spPr>
+        <p:txBody>
+          <a:bodyPr wrap="none" rtlCol="0">
+            <a:spAutoFit/>
+          </a:bodyPr>
+          <a:lstStyle/>
+          <a:p>
+            <a:r>
+              <a:rPr lang="en-GB" sz="1600" dirty="0">
+                <a:latin typeface="Arial" panose="020B0604020202020204" pitchFamily="34" charset="0"/>
+                <a:cs typeface="Arial" panose="020B0604020202020204" pitchFamily="34" charset="0"/>
+              </a:rPr>
+              <a:t>a</a:t>
+            </a:r>
+          </a:p>
+        </p:txBody>
+      </p:sp>
+      <p:sp>
+        <p:nvSpPr>
+          <p:cNvPr id="64" name="TextBox 63">
+            <a:extLst>
+              <a:ext uri="{FF2B5EF4-FFF2-40B4-BE49-F238E27FC236}">
+                <a16:creationId xmlns:a16="http://schemas.microsoft.com/office/drawing/2014/main" id="{49000154-3B93-5490-42FC-63F54555746B}"/>
+              </a:ext>
+            </a:extLst>
+          </p:cNvPr>
+          <p:cNvSpPr txBox="1"/>
+          <p:nvPr/>
+        </p:nvSpPr>
+        <p:spPr>
+          <a:xfrm>
+            <a:off x="10076232" y="3150284"/>
+            <a:ext cx="298480" cy="338554"/>
+          </a:xfrm>
+          <a:prstGeom prst="rect">
+            <a:avLst/>
+          </a:prstGeom>
+          <a:noFill/>
+        </p:spPr>
+        <p:txBody>
+          <a:bodyPr wrap="none" rtlCol="0">
+            <a:spAutoFit/>
+          </a:bodyPr>
+          <a:lstStyle/>
+          <a:p>
+            <a:r>
+              <a:rPr lang="en-GB" sz="1600" dirty="0">
+                <a:latin typeface="Arial" panose="020B0604020202020204" pitchFamily="34" charset="0"/>
+                <a:cs typeface="Arial" panose="020B0604020202020204" pitchFamily="34" charset="0"/>
+              </a:rPr>
+              <a:t>b</a:t>
+            </a:r>
+          </a:p>
+        </p:txBody>
+      </p:sp>
+      <p:sp>
+        <p:nvSpPr>
+          <p:cNvPr id="65" name="TextBox 64">
+            <a:extLst>
+              <a:ext uri="{FF2B5EF4-FFF2-40B4-BE49-F238E27FC236}">
+                <a16:creationId xmlns:a16="http://schemas.microsoft.com/office/drawing/2014/main" id="{4BFD3BD8-5DAC-E194-047A-686C7CEE7265}"/>
+              </a:ext>
+            </a:extLst>
+          </p:cNvPr>
+          <p:cNvSpPr txBox="1"/>
+          <p:nvPr/>
+        </p:nvSpPr>
+        <p:spPr>
+          <a:xfrm>
+            <a:off x="10920923" y="4655460"/>
+            <a:ext cx="298480" cy="338554"/>
+          </a:xfrm>
+          <a:prstGeom prst="rect">
+            <a:avLst/>
+          </a:prstGeom>
+          <a:noFill/>
+        </p:spPr>
+        <p:txBody>
+          <a:bodyPr wrap="none" rtlCol="0">
+            <a:spAutoFit/>
+          </a:bodyPr>
+          <a:lstStyle/>
+          <a:p>
+            <a:r>
+              <a:rPr lang="en-GB" sz="1600" dirty="0">
+                <a:latin typeface="Arial" panose="020B0604020202020204" pitchFamily="34" charset="0"/>
+                <a:cs typeface="Arial" panose="020B0604020202020204" pitchFamily="34" charset="0"/>
+              </a:rPr>
+              <a:t>c</a:t>
+            </a:r>
+          </a:p>
+        </p:txBody>
+      </p:sp>
+      <p:sp>
+        <p:nvSpPr>
+          <p:cNvPr id="66" name="TextBox 65">
+            <a:extLst>
+              <a:ext uri="{FF2B5EF4-FFF2-40B4-BE49-F238E27FC236}">
+                <a16:creationId xmlns:a16="http://schemas.microsoft.com/office/drawing/2014/main" id="{CC58D290-9045-399F-1184-0C71D6753F9E}"/>
+              </a:ext>
+            </a:extLst>
+          </p:cNvPr>
+          <p:cNvSpPr txBox="1"/>
+          <p:nvPr/>
+        </p:nvSpPr>
+        <p:spPr>
+          <a:xfrm>
+            <a:off x="11290400" y="3822573"/>
+            <a:ext cx="514885" cy="338554"/>
+          </a:xfrm>
+          <a:prstGeom prst="rect">
+            <a:avLst/>
+          </a:prstGeom>
+          <a:noFill/>
+        </p:spPr>
+        <p:txBody>
+          <a:bodyPr wrap="none" rtlCol="0">
+            <a:spAutoFit/>
+          </a:bodyPr>
+          <a:lstStyle/>
+          <a:p>
+            <a:r>
+              <a:rPr lang="en-GB" sz="1600" dirty="0" err="1">
+                <a:latin typeface="Arial" panose="020B0604020202020204" pitchFamily="34" charset="0"/>
+                <a:cs typeface="Arial" panose="020B0604020202020204" pitchFamily="34" charset="0"/>
+              </a:rPr>
+              <a:t>abc</a:t>
+            </a:r>
+            <a:endParaRPr lang="en-GB" sz="1600" dirty="0">
+              <a:latin typeface="Arial" panose="020B0604020202020204" pitchFamily="34" charset="0"/>
+              <a:cs typeface="Arial" panose="020B0604020202020204" pitchFamily="34" charset="0"/>
+            </a:endParaRPr>
+          </a:p>
+        </p:txBody>
+      </p:sp>
+      <p:pic>
+        <p:nvPicPr>
+          <p:cNvPr id="2" name="Picture 1">
+            <a:extLst>
+              <a:ext uri="{FF2B5EF4-FFF2-40B4-BE49-F238E27FC236}">
+                <a16:creationId xmlns:a16="http://schemas.microsoft.com/office/drawing/2014/main" id="{5A874471-01C8-031D-BC04-A05323EAABE3}"/>
+              </a:ext>
+            </a:extLst>
+          </p:cNvPr>
+          <p:cNvPicPr>
+            <a:picLocks noChangeAspect="1"/>
+          </p:cNvPicPr>
+          <p:nvPr/>
+        </p:nvPicPr>
+        <p:blipFill rotWithShape="1">
+          <a:blip r:embed="rId5"/>
+          <a:srcRect b="57282"/>
+          <a:stretch/>
+        </p:blipFill>
+        <p:spPr>
+          <a:xfrm>
+            <a:off x="0" y="6174592"/>
+            <a:ext cx="12192000" cy="2604052"/>
+          </a:xfrm>
+          <a:prstGeom prst="rect">
+            <a:avLst/>
+          </a:prstGeom>
+        </p:spPr>
+      </p:pic>
+      <p:pic>
+        <p:nvPicPr>
+          <p:cNvPr id="3" name="Picture 2">
+            <a:extLst>
+              <a:ext uri="{FF2B5EF4-FFF2-40B4-BE49-F238E27FC236}">
+                <a16:creationId xmlns:a16="http://schemas.microsoft.com/office/drawing/2014/main" id="{40DEFB8E-40DA-7905-C275-248ADF692546}"/>
+              </a:ext>
+            </a:extLst>
+          </p:cNvPr>
+          <p:cNvPicPr>
+            <a:picLocks noChangeAspect="1"/>
+          </p:cNvPicPr>
+          <p:nvPr/>
+        </p:nvPicPr>
+        <p:blipFill rotWithShape="1">
+          <a:blip r:embed="rId6"/>
+          <a:srcRect t="49728" b="8858"/>
+          <a:stretch/>
+        </p:blipFill>
+        <p:spPr>
+          <a:xfrm>
+            <a:off x="0" y="9171290"/>
+            <a:ext cx="12192000" cy="2524539"/>
+          </a:xfrm>
+          <a:prstGeom prst="rect">
+            <a:avLst/>
+          </a:prstGeom>
+        </p:spPr>
+      </p:pic>
+      <p:sp>
+        <p:nvSpPr>
+          <p:cNvPr id="4" name="TextBox 3">
+            <a:extLst>
+              <a:ext uri="{FF2B5EF4-FFF2-40B4-BE49-F238E27FC236}">
+                <a16:creationId xmlns:a16="http://schemas.microsoft.com/office/drawing/2014/main" id="{1411413F-797D-92EC-2F15-6307F88A2370}"/>
+              </a:ext>
+            </a:extLst>
+          </p:cNvPr>
+          <p:cNvSpPr txBox="1"/>
+          <p:nvPr/>
+        </p:nvSpPr>
+        <p:spPr>
+          <a:xfrm rot="16200000">
+            <a:off x="-1173509" y="10364541"/>
+            <a:ext cx="2734715" cy="307777"/>
+          </a:xfrm>
+          <a:prstGeom prst="rect">
+            <a:avLst/>
+          </a:prstGeom>
+          <a:solidFill>
+            <a:srgbClr val="FFFFFF"/>
+          </a:solidFill>
+        </p:spPr>
+        <p:txBody>
+          <a:bodyPr wrap="square" rtlCol="0">
+            <a:spAutoFit/>
+          </a:bodyPr>
+          <a:lstStyle/>
+          <a:p>
+            <a:pPr algn="ctr"/>
+            <a:r>
+              <a:rPr lang="en-GB" sz="1400" b="1" dirty="0">
+                <a:latin typeface="Arial" panose="020B0604020202020204" pitchFamily="34" charset="0"/>
+                <a:cs typeface="Arial" panose="020B0604020202020204" pitchFamily="34" charset="0"/>
+              </a:rPr>
+              <a:t>Spatial variability of NDSI</a:t>
+            </a:r>
+            <a:r>
+              <a:rPr lang="en-GB" sz="1400" b="1" baseline="-25000" dirty="0">
+                <a:latin typeface="Arial" panose="020B0604020202020204" pitchFamily="34" charset="0"/>
+                <a:cs typeface="Arial" panose="020B0604020202020204" pitchFamily="34" charset="0"/>
+              </a:rPr>
+              <a:t>Anthro</a:t>
+            </a:r>
+          </a:p>
+        </p:txBody>
+      </p:sp>
+      <p:sp>
+        <p:nvSpPr>
+          <p:cNvPr id="5" name="TextBox 4">
+            <a:extLst>
+              <a:ext uri="{FF2B5EF4-FFF2-40B4-BE49-F238E27FC236}">
+                <a16:creationId xmlns:a16="http://schemas.microsoft.com/office/drawing/2014/main" id="{78EB74CE-9F6A-3494-67BA-DEBFA382F347}"/>
+              </a:ext>
+            </a:extLst>
+          </p:cNvPr>
+          <p:cNvSpPr txBox="1"/>
+          <p:nvPr/>
+        </p:nvSpPr>
+        <p:spPr>
+          <a:xfrm rot="16200000">
+            <a:off x="-1171329" y="7452715"/>
+            <a:ext cx="2734714" cy="307777"/>
+          </a:xfrm>
+          <a:prstGeom prst="rect">
+            <a:avLst/>
+          </a:prstGeom>
+          <a:solidFill>
+            <a:srgbClr val="FFFFFF"/>
+          </a:solidFill>
+        </p:spPr>
+        <p:txBody>
+          <a:bodyPr wrap="square" rtlCol="0">
+            <a:spAutoFit/>
+          </a:bodyPr>
+          <a:lstStyle/>
+          <a:p>
+            <a:pPr algn="ctr"/>
+            <a:r>
+              <a:rPr lang="en-GB" sz="1400" b="1" dirty="0">
+                <a:latin typeface="Arial" panose="020B0604020202020204" pitchFamily="34" charset="0"/>
+                <a:cs typeface="Arial" panose="020B0604020202020204" pitchFamily="34" charset="0"/>
+              </a:rPr>
+              <a:t>Spatial variability of NDSI</a:t>
+            </a:r>
+            <a:r>
+              <a:rPr lang="en-GB" sz="1400" b="1" baseline="-25000" dirty="0">
+                <a:latin typeface="Arial" panose="020B0604020202020204" pitchFamily="34" charset="0"/>
+                <a:cs typeface="Arial" panose="020B0604020202020204" pitchFamily="34" charset="0"/>
+              </a:rPr>
+              <a:t>Anthro</a:t>
+            </a:r>
+            <a:endParaRPr lang="en-GB" sz="1400" b="1" dirty="0">
+              <a:latin typeface="Arial" panose="020B0604020202020204" pitchFamily="34" charset="0"/>
+              <a:cs typeface="Arial" panose="020B0604020202020204" pitchFamily="34" charset="0"/>
+            </a:endParaRPr>
+          </a:p>
+        </p:txBody>
+      </p:sp>
+      <p:sp>
+        <p:nvSpPr>
+          <p:cNvPr id="6" name="TextBox 5">
+            <a:extLst>
+              <a:ext uri="{FF2B5EF4-FFF2-40B4-BE49-F238E27FC236}">
+                <a16:creationId xmlns:a16="http://schemas.microsoft.com/office/drawing/2014/main" id="{EFAB74B9-0DEB-FEAD-A28C-78308629A34F}"/>
+              </a:ext>
+            </a:extLst>
+          </p:cNvPr>
+          <p:cNvSpPr txBox="1"/>
+          <p:nvPr/>
+        </p:nvSpPr>
+        <p:spPr>
+          <a:xfrm rot="19357041">
+            <a:off x="647348" y="11778028"/>
+            <a:ext cx="670376" cy="276999"/>
+          </a:xfrm>
+          <a:prstGeom prst="rect">
+            <a:avLst/>
+          </a:prstGeom>
+          <a:noFill/>
+        </p:spPr>
+        <p:txBody>
+          <a:bodyPr wrap="none" rtlCol="0">
+            <a:spAutoFit/>
+          </a:bodyPr>
+          <a:lstStyle/>
+          <a:p>
+            <a:r>
+              <a:rPr lang="en-GB" sz="1200" dirty="0">
+                <a:latin typeface="Arial" panose="020B0604020202020204" pitchFamily="34" charset="0"/>
+                <a:cs typeface="Arial" panose="020B0604020202020204" pitchFamily="34" charset="0"/>
+              </a:rPr>
+              <a:t>Sep 01</a:t>
+            </a:r>
+          </a:p>
+        </p:txBody>
+      </p:sp>
+      <p:sp>
+        <p:nvSpPr>
+          <p:cNvPr id="7" name="TextBox 6">
+            <a:extLst>
+              <a:ext uri="{FF2B5EF4-FFF2-40B4-BE49-F238E27FC236}">
+                <a16:creationId xmlns:a16="http://schemas.microsoft.com/office/drawing/2014/main" id="{F036910F-419E-18BC-0FFC-84374630B715}"/>
+              </a:ext>
+            </a:extLst>
+          </p:cNvPr>
+          <p:cNvSpPr txBox="1"/>
+          <p:nvPr/>
+        </p:nvSpPr>
+        <p:spPr>
+          <a:xfrm rot="19357041">
+            <a:off x="2230299" y="11778029"/>
+            <a:ext cx="670376" cy="276999"/>
+          </a:xfrm>
+          <a:prstGeom prst="rect">
+            <a:avLst/>
+          </a:prstGeom>
+          <a:noFill/>
+        </p:spPr>
+        <p:txBody>
+          <a:bodyPr wrap="none" rtlCol="0">
+            <a:spAutoFit/>
+          </a:bodyPr>
+          <a:lstStyle/>
+          <a:p>
+            <a:r>
+              <a:rPr lang="en-GB" sz="1200" dirty="0">
+                <a:latin typeface="Arial" panose="020B0604020202020204" pitchFamily="34" charset="0"/>
+                <a:cs typeface="Arial" panose="020B0604020202020204" pitchFamily="34" charset="0"/>
+              </a:rPr>
+              <a:t>Sep 15</a:t>
+            </a:r>
+          </a:p>
+        </p:txBody>
+      </p:sp>
+      <p:sp>
+        <p:nvSpPr>
+          <p:cNvPr id="8" name="TextBox 7">
+            <a:extLst>
+              <a:ext uri="{FF2B5EF4-FFF2-40B4-BE49-F238E27FC236}">
+                <a16:creationId xmlns:a16="http://schemas.microsoft.com/office/drawing/2014/main" id="{6DB060D3-1034-3502-62F8-5F29F3B58747}"/>
+              </a:ext>
+            </a:extLst>
+          </p:cNvPr>
+          <p:cNvSpPr txBox="1"/>
+          <p:nvPr/>
+        </p:nvSpPr>
+        <p:spPr>
+          <a:xfrm rot="19357041">
+            <a:off x="4110773" y="11768295"/>
+            <a:ext cx="638316" cy="276999"/>
+          </a:xfrm>
+          <a:prstGeom prst="rect">
+            <a:avLst/>
+          </a:prstGeom>
+          <a:noFill/>
+        </p:spPr>
+        <p:txBody>
+          <a:bodyPr wrap="none" rtlCol="0">
+            <a:spAutoFit/>
+          </a:bodyPr>
+          <a:lstStyle/>
+          <a:p>
+            <a:r>
+              <a:rPr lang="en-GB" sz="1200" dirty="0">
+                <a:latin typeface="Arial" panose="020B0604020202020204" pitchFamily="34" charset="0"/>
+                <a:cs typeface="Arial" panose="020B0604020202020204" pitchFamily="34" charset="0"/>
+              </a:rPr>
+              <a:t>Oct 01</a:t>
+            </a:r>
+          </a:p>
+        </p:txBody>
+      </p:sp>
+      <p:sp>
+        <p:nvSpPr>
+          <p:cNvPr id="9" name="TextBox 8">
+            <a:extLst>
+              <a:ext uri="{FF2B5EF4-FFF2-40B4-BE49-F238E27FC236}">
+                <a16:creationId xmlns:a16="http://schemas.microsoft.com/office/drawing/2014/main" id="{4A1E454D-4271-75B0-D104-2A27DBD7FD39}"/>
+              </a:ext>
+            </a:extLst>
+          </p:cNvPr>
+          <p:cNvSpPr txBox="1"/>
+          <p:nvPr/>
+        </p:nvSpPr>
+        <p:spPr>
+          <a:xfrm rot="19357041">
+            <a:off x="5684355" y="11768295"/>
+            <a:ext cx="638316" cy="276999"/>
+          </a:xfrm>
+          <a:prstGeom prst="rect">
+            <a:avLst/>
+          </a:prstGeom>
+          <a:noFill/>
+        </p:spPr>
+        <p:txBody>
+          <a:bodyPr wrap="none" rtlCol="0">
+            <a:spAutoFit/>
+          </a:bodyPr>
+          <a:lstStyle/>
+          <a:p>
+            <a:r>
+              <a:rPr lang="en-GB" sz="1200" dirty="0">
+                <a:latin typeface="Arial" panose="020B0604020202020204" pitchFamily="34" charset="0"/>
+                <a:cs typeface="Arial" panose="020B0604020202020204" pitchFamily="34" charset="0"/>
+              </a:rPr>
+              <a:t>Oct 15</a:t>
+            </a:r>
+          </a:p>
+        </p:txBody>
+      </p:sp>
+      <p:sp>
+        <p:nvSpPr>
+          <p:cNvPr id="10" name="TextBox 9">
+            <a:extLst>
+              <a:ext uri="{FF2B5EF4-FFF2-40B4-BE49-F238E27FC236}">
+                <a16:creationId xmlns:a16="http://schemas.microsoft.com/office/drawing/2014/main" id="{2FB976BD-4E34-7C29-25B8-FC6EDE2285D3}"/>
+              </a:ext>
+            </a:extLst>
+          </p:cNvPr>
+          <p:cNvSpPr txBox="1"/>
+          <p:nvPr/>
+        </p:nvSpPr>
+        <p:spPr>
+          <a:xfrm rot="19357041">
+            <a:off x="7649525" y="11778029"/>
+            <a:ext cx="670376" cy="276999"/>
+          </a:xfrm>
+          <a:prstGeom prst="rect">
+            <a:avLst/>
+          </a:prstGeom>
+          <a:noFill/>
+        </p:spPr>
+        <p:txBody>
+          <a:bodyPr wrap="none" rtlCol="0">
+            <a:spAutoFit/>
+          </a:bodyPr>
+          <a:lstStyle/>
+          <a:p>
+            <a:r>
+              <a:rPr lang="en-GB" sz="1200" dirty="0">
+                <a:latin typeface="Arial" panose="020B0604020202020204" pitchFamily="34" charset="0"/>
+                <a:cs typeface="Arial" panose="020B0604020202020204" pitchFamily="34" charset="0"/>
+              </a:rPr>
+              <a:t>Nov 01</a:t>
+            </a:r>
+          </a:p>
+        </p:txBody>
+      </p:sp>
+      <p:sp>
+        <p:nvSpPr>
+          <p:cNvPr id="11" name="TextBox 10">
+            <a:extLst>
+              <a:ext uri="{FF2B5EF4-FFF2-40B4-BE49-F238E27FC236}">
+                <a16:creationId xmlns:a16="http://schemas.microsoft.com/office/drawing/2014/main" id="{B7ECE87E-A2AE-2A30-7309-2380552E4468}"/>
+              </a:ext>
+            </a:extLst>
+          </p:cNvPr>
+          <p:cNvSpPr txBox="1"/>
+          <p:nvPr/>
+        </p:nvSpPr>
+        <p:spPr>
+          <a:xfrm>
+            <a:off x="724643" y="12074399"/>
             <a:ext cx="8103476" cy="307777"/>
           </a:xfrm>
           <a:prstGeom prst="rect">
@@ -3698,10 +4973,10 @@
       </p:sp>
       <p:sp>
         <p:nvSpPr>
-          <p:cNvPr id="13" name="TextBox 12">
+          <p:cNvPr id="12" name="TextBox 11">
             <a:extLst>
               <a:ext uri="{FF2B5EF4-FFF2-40B4-BE49-F238E27FC236}">
-                <a16:creationId xmlns:a16="http://schemas.microsoft.com/office/drawing/2014/main" id="{AAC9A2F2-4F40-A12A-D420-AECD028F66A9}"/>
+                <a16:creationId xmlns:a16="http://schemas.microsoft.com/office/drawing/2014/main" id="{86E8D724-96D0-F600-163B-7A183E4E270F}"/>
               </a:ext>
             </a:extLst>
           </p:cNvPr>
@@ -3709,40 +4984,37 @@
           <p:nvPr/>
         </p:nvSpPr>
         <p:spPr>
-          <a:xfrm rot="16200000">
-            <a:off x="-1051627" y="4346566"/>
-            <a:ext cx="2490952" cy="307777"/>
-          </a:xfrm>
-          <a:prstGeom prst="rect">
-            <a:avLst/>
-          </a:prstGeom>
-          <a:solidFill>
-            <a:srgbClr val="FFFFFF"/>
-          </a:solidFill>
-        </p:spPr>
-        <p:txBody>
-          <a:bodyPr wrap="square" rtlCol="0">
+          <a:xfrm>
+            <a:off x="9771026" y="11681180"/>
+            <a:ext cx="620683" cy="276999"/>
+          </a:xfrm>
+          <a:prstGeom prst="rect">
+            <a:avLst/>
+          </a:prstGeom>
+          <a:noFill/>
+        </p:spPr>
+        <p:txBody>
+          <a:bodyPr wrap="none" rtlCol="0">
             <a:spAutoFit/>
           </a:bodyPr>
           <a:lstStyle/>
           <a:p>
-            <a:pPr algn="ctr"/>
-            <a:r>
-              <a:rPr lang="en-GB" sz="1400" b="1" dirty="0">
+            <a:r>
+              <a:rPr lang="en-GB" sz="1200" dirty="0">
                 <a:latin typeface="Arial" panose="020B0604020202020204" pitchFamily="34" charset="0"/>
                 <a:cs typeface="Arial" panose="020B0604020202020204" pitchFamily="34" charset="0"/>
               </a:rPr>
-              <a:t>Spatial variability of NDSI</a:t>
-            </a:r>
-          </a:p>
-        </p:txBody>
-      </p:sp>
-      <p:sp>
-        <p:nvSpPr>
-          <p:cNvPr id="14" name="TextBox 13">
+              <a:t>Forest</a:t>
+            </a:r>
+          </a:p>
+        </p:txBody>
+      </p:sp>
+      <p:sp>
+        <p:nvSpPr>
+          <p:cNvPr id="13" name="TextBox 12">
             <a:extLst>
               <a:ext uri="{FF2B5EF4-FFF2-40B4-BE49-F238E27FC236}">
-                <a16:creationId xmlns:a16="http://schemas.microsoft.com/office/drawing/2014/main" id="{6AF4625E-4139-6A98-DB78-EFFBFAAF2930}"/>
+                <a16:creationId xmlns:a16="http://schemas.microsoft.com/office/drawing/2014/main" id="{81A1A9B4-038A-F730-1DD4-A48896FEE973}"/>
               </a:ext>
             </a:extLst>
           </p:cNvPr>
@@ -3750,40 +5022,37 @@
           <p:nvPr/>
         </p:nvSpPr>
         <p:spPr>
-          <a:xfrm rot="16200000">
-            <a:off x="-1049448" y="1335350"/>
-            <a:ext cx="2490952" cy="307777"/>
-          </a:xfrm>
-          <a:prstGeom prst="rect">
-            <a:avLst/>
-          </a:prstGeom>
-          <a:solidFill>
-            <a:srgbClr val="FFFFFF"/>
-          </a:solidFill>
-        </p:spPr>
-        <p:txBody>
-          <a:bodyPr wrap="square" rtlCol="0">
+          <a:xfrm>
+            <a:off x="10839010" y="11681180"/>
+            <a:ext cx="915635" cy="276999"/>
+          </a:xfrm>
+          <a:prstGeom prst="rect">
+            <a:avLst/>
+          </a:prstGeom>
+          <a:noFill/>
+        </p:spPr>
+        <p:txBody>
+          <a:bodyPr wrap="none" rtlCol="0">
             <a:spAutoFit/>
           </a:bodyPr>
           <a:lstStyle/>
           <a:p>
-            <a:pPr algn="ctr"/>
-            <a:r>
-              <a:rPr lang="en-GB" sz="1400" b="1" dirty="0">
+            <a:r>
+              <a:rPr lang="en-GB" sz="1200" dirty="0">
                 <a:latin typeface="Arial" panose="020B0604020202020204" pitchFamily="34" charset="0"/>
                 <a:cs typeface="Arial" panose="020B0604020202020204" pitchFamily="34" charset="0"/>
               </a:rPr>
-              <a:t>Spatial variability of NDSI</a:t>
-            </a:r>
-          </a:p>
-        </p:txBody>
-      </p:sp>
-      <p:sp>
-        <p:nvSpPr>
-          <p:cNvPr id="15" name="TextBox 14">
+              <a:t>Developed</a:t>
+            </a:r>
+          </a:p>
+        </p:txBody>
+      </p:sp>
+      <p:sp>
+        <p:nvSpPr>
+          <p:cNvPr id="14" name="TextBox 13">
             <a:extLst>
               <a:ext uri="{FF2B5EF4-FFF2-40B4-BE49-F238E27FC236}">
-                <a16:creationId xmlns:a16="http://schemas.microsoft.com/office/drawing/2014/main" id="{29EC9143-3D5D-08AF-884C-5188854719C1}"/>
+                <a16:creationId xmlns:a16="http://schemas.microsoft.com/office/drawing/2014/main" id="{B7CAD8C6-BC43-EF97-C2CF-F608E90E1C5F}"/>
               </a:ext>
             </a:extLst>
           </p:cNvPr>
@@ -3792,8 +5061,8 @@
         </p:nvSpPr>
         <p:spPr>
           <a:xfrm>
-            <a:off x="9761082" y="5730166"/>
-            <a:ext cx="620683" cy="276999"/>
+            <a:off x="9322112" y="12001485"/>
+            <a:ext cx="2722179" cy="307777"/>
           </a:xfrm>
           <a:prstGeom prst="rect">
             <a:avLst/>
@@ -3801,27 +5070,28 @@
           <a:noFill/>
         </p:spPr>
         <p:txBody>
-          <a:bodyPr wrap="none" rtlCol="0">
+          <a:bodyPr wrap="square" rtlCol="0">
             <a:spAutoFit/>
           </a:bodyPr>
           <a:lstStyle/>
           <a:p>
-            <a:r>
-              <a:rPr lang="en-GB" sz="1200" dirty="0">
+            <a:pPr algn="ctr"/>
+            <a:r>
+              <a:rPr lang="en-GB" sz="1400" b="1" dirty="0">
                 <a:latin typeface="Arial" panose="020B0604020202020204" pitchFamily="34" charset="0"/>
                 <a:cs typeface="Arial" panose="020B0604020202020204" pitchFamily="34" charset="0"/>
               </a:rPr>
-              <a:t>Forest</a:t>
-            </a:r>
-          </a:p>
-        </p:txBody>
-      </p:sp>
-      <p:sp>
-        <p:nvSpPr>
-          <p:cNvPr id="16" name="TextBox 15">
+              <a:t>Land use </a:t>
+            </a:r>
+          </a:p>
+        </p:txBody>
+      </p:sp>
+      <p:sp>
+        <p:nvSpPr>
+          <p:cNvPr id="15" name="TextBox 14">
             <a:extLst>
               <a:ext uri="{FF2B5EF4-FFF2-40B4-BE49-F238E27FC236}">
-                <a16:creationId xmlns:a16="http://schemas.microsoft.com/office/drawing/2014/main" id="{FDB2D379-A9AA-395A-EE6A-733A7226A5F7}"/>
+                <a16:creationId xmlns:a16="http://schemas.microsoft.com/office/drawing/2014/main" id="{6EA1517C-1BB2-0891-5F4A-55FA04673FD1}"/>
               </a:ext>
             </a:extLst>
           </p:cNvPr>
@@ -3830,8 +5100,8 @@
         </p:nvSpPr>
         <p:spPr>
           <a:xfrm>
-            <a:off x="10829066" y="5730166"/>
-            <a:ext cx="915635" cy="276999"/>
+            <a:off x="9564421" y="8717718"/>
+            <a:ext cx="1019503" cy="276999"/>
           </a:xfrm>
           <a:prstGeom prst="rect">
             <a:avLst/>
@@ -3839,27 +5109,28 @@
           <a:noFill/>
         </p:spPr>
         <p:txBody>
-          <a:bodyPr wrap="none" rtlCol="0">
+          <a:bodyPr wrap="square" rtlCol="0">
             <a:spAutoFit/>
           </a:bodyPr>
           <a:lstStyle/>
           <a:p>
+            <a:pPr algn="ctr"/>
             <a:r>
               <a:rPr lang="en-GB" sz="1200" dirty="0">
                 <a:latin typeface="Arial" panose="020B0604020202020204" pitchFamily="34" charset="0"/>
                 <a:cs typeface="Arial" panose="020B0604020202020204" pitchFamily="34" charset="0"/>
               </a:rPr>
-              <a:t>Developed</a:t>
-            </a:r>
-          </a:p>
-        </p:txBody>
-      </p:sp>
-      <p:sp>
-        <p:nvSpPr>
-          <p:cNvPr id="17" name="TextBox 16">
+              <a:t>Pre-typhoon</a:t>
+            </a:r>
+          </a:p>
+        </p:txBody>
+      </p:sp>
+      <p:sp>
+        <p:nvSpPr>
+          <p:cNvPr id="16" name="TextBox 15">
             <a:extLst>
               <a:ext uri="{FF2B5EF4-FFF2-40B4-BE49-F238E27FC236}">
-                <a16:creationId xmlns:a16="http://schemas.microsoft.com/office/drawing/2014/main" id="{586BC236-546D-8B58-6029-4FCB8B06C6F5}"/>
+                <a16:creationId xmlns:a16="http://schemas.microsoft.com/office/drawing/2014/main" id="{1201BEF4-38A2-9FA0-52F8-5AC682794109}"/>
               </a:ext>
             </a:extLst>
           </p:cNvPr>
@@ -3868,8 +5139,8 @@
         </p:nvSpPr>
         <p:spPr>
           <a:xfrm>
-            <a:off x="9312168" y="6050471"/>
-            <a:ext cx="2722179" cy="307777"/>
+            <a:off x="10755494" y="8717718"/>
+            <a:ext cx="1088760" cy="276999"/>
           </a:xfrm>
           <a:prstGeom prst="rect">
             <a:avLst/>
@@ -3877,28 +5148,28 @@
           <a:noFill/>
         </p:spPr>
         <p:txBody>
-          <a:bodyPr wrap="square" rtlCol="0">
+          <a:bodyPr wrap="none" rtlCol="0">
             <a:spAutoFit/>
           </a:bodyPr>
           <a:lstStyle/>
           <a:p>
             <a:pPr algn="ctr"/>
             <a:r>
-              <a:rPr lang="en-GB" sz="1400" b="1" dirty="0">
+              <a:rPr lang="en-GB" sz="1200" dirty="0">
                 <a:latin typeface="Arial" panose="020B0604020202020204" pitchFamily="34" charset="0"/>
                 <a:cs typeface="Arial" panose="020B0604020202020204" pitchFamily="34" charset="0"/>
               </a:rPr>
-              <a:t>Land use </a:t>
-            </a:r>
-          </a:p>
-        </p:txBody>
-      </p:sp>
-      <p:sp>
-        <p:nvSpPr>
-          <p:cNvPr id="18" name="TextBox 17">
+              <a:t>Post-typhoon</a:t>
+            </a:r>
+          </a:p>
+        </p:txBody>
+      </p:sp>
+      <p:sp>
+        <p:nvSpPr>
+          <p:cNvPr id="17" name="TextBox 16">
             <a:extLst>
               <a:ext uri="{FF2B5EF4-FFF2-40B4-BE49-F238E27FC236}">
-                <a16:creationId xmlns:a16="http://schemas.microsoft.com/office/drawing/2014/main" id="{43FBD685-766C-623C-046F-CCB65B1CAFFF}"/>
+                <a16:creationId xmlns:a16="http://schemas.microsoft.com/office/drawing/2014/main" id="{CDA5A27B-58D1-77FE-AE17-35624D741B0A}"/>
               </a:ext>
             </a:extLst>
           </p:cNvPr>
@@ -3907,8 +5178,8 @@
         </p:nvSpPr>
         <p:spPr>
           <a:xfrm>
-            <a:off x="9564416" y="2637497"/>
-            <a:ext cx="1019503" cy="276999"/>
+            <a:off x="9312173" y="8978903"/>
+            <a:ext cx="2722179" cy="307777"/>
           </a:xfrm>
           <a:prstGeom prst="rect">
             <a:avLst/>
@@ -3923,21 +5194,21 @@
           <a:p>
             <a:pPr algn="ctr"/>
             <a:r>
-              <a:rPr lang="en-GB" sz="1200" dirty="0">
+              <a:rPr lang="en-GB" sz="1400" b="1" dirty="0">
                 <a:latin typeface="Arial" panose="020B0604020202020204" pitchFamily="34" charset="0"/>
                 <a:cs typeface="Arial" panose="020B0604020202020204" pitchFamily="34" charset="0"/>
               </a:rPr>
-              <a:t>Pre-typhoon</a:t>
-            </a:r>
-          </a:p>
-        </p:txBody>
-      </p:sp>
-      <p:sp>
-        <p:nvSpPr>
-          <p:cNvPr id="19" name="TextBox 18">
+              <a:t>Time period</a:t>
+            </a:r>
+          </a:p>
+        </p:txBody>
+      </p:sp>
+      <p:sp>
+        <p:nvSpPr>
+          <p:cNvPr id="18" name="TextBox 17">
             <a:extLst>
               <a:ext uri="{FF2B5EF4-FFF2-40B4-BE49-F238E27FC236}">
-                <a16:creationId xmlns:a16="http://schemas.microsoft.com/office/drawing/2014/main" id="{9982393E-B0D7-9493-59EE-D33E887A4B6A}"/>
+                <a16:creationId xmlns:a16="http://schemas.microsoft.com/office/drawing/2014/main" id="{F72B0258-1763-A205-5B20-737F980EFA6B}"/>
               </a:ext>
             </a:extLst>
           </p:cNvPr>
@@ -3945,9 +5216,9 @@
           <p:nvPr/>
         </p:nvSpPr>
         <p:spPr>
-          <a:xfrm>
-            <a:off x="10755494" y="2637497"/>
-            <a:ext cx="1088760" cy="276999"/>
+          <a:xfrm rot="19357041">
+            <a:off x="637409" y="8822487"/>
+            <a:ext cx="670376" cy="276999"/>
           </a:xfrm>
           <a:prstGeom prst="rect">
             <a:avLst/>
@@ -3960,23 +5231,22 @@
           </a:bodyPr>
           <a:lstStyle/>
           <a:p>
-            <a:pPr algn="ctr"/>
             <a:r>
               <a:rPr lang="en-GB" sz="1200" dirty="0">
                 <a:latin typeface="Arial" panose="020B0604020202020204" pitchFamily="34" charset="0"/>
                 <a:cs typeface="Arial" panose="020B0604020202020204" pitchFamily="34" charset="0"/>
               </a:rPr>
-              <a:t>Post-typhoon</a:t>
-            </a:r>
-          </a:p>
-        </p:txBody>
-      </p:sp>
-      <p:sp>
-        <p:nvSpPr>
-          <p:cNvPr id="20" name="TextBox 19">
+              <a:t>Sep 01</a:t>
+            </a:r>
+          </a:p>
+        </p:txBody>
+      </p:sp>
+      <p:sp>
+        <p:nvSpPr>
+          <p:cNvPr id="19" name="TextBox 18">
             <a:extLst>
               <a:ext uri="{FF2B5EF4-FFF2-40B4-BE49-F238E27FC236}">
-                <a16:creationId xmlns:a16="http://schemas.microsoft.com/office/drawing/2014/main" id="{F988CB6E-82A9-C860-2884-7D4987E95744}"/>
+                <a16:creationId xmlns:a16="http://schemas.microsoft.com/office/drawing/2014/main" id="{3B1D5D29-4F0B-3FBD-0E3E-E63D8ED99261}"/>
               </a:ext>
             </a:extLst>
           </p:cNvPr>
@@ -3984,9 +5254,9 @@
           <p:nvPr/>
         </p:nvSpPr>
         <p:spPr>
-          <a:xfrm>
-            <a:off x="9312168" y="2898682"/>
-            <a:ext cx="2722179" cy="307777"/>
+          <a:xfrm rot="19357041">
+            <a:off x="2220360" y="8822488"/>
+            <a:ext cx="670376" cy="276999"/>
           </a:xfrm>
           <a:prstGeom prst="rect">
             <a:avLst/>
@@ -3994,28 +5264,27 @@
           <a:noFill/>
         </p:spPr>
         <p:txBody>
-          <a:bodyPr wrap="square" rtlCol="0">
+          <a:bodyPr wrap="none" rtlCol="0">
             <a:spAutoFit/>
           </a:bodyPr>
           <a:lstStyle/>
           <a:p>
-            <a:pPr algn="ctr"/>
-            <a:r>
-              <a:rPr lang="en-GB" sz="1400" b="1" dirty="0">
+            <a:r>
+              <a:rPr lang="en-GB" sz="1200" dirty="0">
                 <a:latin typeface="Arial" panose="020B0604020202020204" pitchFamily="34" charset="0"/>
                 <a:cs typeface="Arial" panose="020B0604020202020204" pitchFamily="34" charset="0"/>
               </a:rPr>
-              <a:t>Time period</a:t>
-            </a:r>
-          </a:p>
-        </p:txBody>
-      </p:sp>
-      <p:sp>
-        <p:nvSpPr>
-          <p:cNvPr id="21" name="TextBox 20">
+              <a:t>Sep 15</a:t>
+            </a:r>
+          </a:p>
+        </p:txBody>
+      </p:sp>
+      <p:sp>
+        <p:nvSpPr>
+          <p:cNvPr id="20" name="TextBox 19">
             <a:extLst>
               <a:ext uri="{FF2B5EF4-FFF2-40B4-BE49-F238E27FC236}">
-                <a16:creationId xmlns:a16="http://schemas.microsoft.com/office/drawing/2014/main" id="{EAF5A2AD-5D87-49BA-EEC1-43B9EB0EE9B0}"/>
+                <a16:creationId xmlns:a16="http://schemas.microsoft.com/office/drawing/2014/main" id="{AD85898D-485C-525A-D980-CAA4877F79EF}"/>
               </a:ext>
             </a:extLst>
           </p:cNvPr>
@@ -4024,8 +5293,8 @@
         </p:nvSpPr>
         <p:spPr>
           <a:xfrm rot="19357041">
-            <a:off x="597653" y="2742266"/>
-            <a:ext cx="670376" cy="276999"/>
+            <a:off x="4100834" y="8812754"/>
+            <a:ext cx="638316" cy="276999"/>
           </a:xfrm>
           <a:prstGeom prst="rect">
             <a:avLst/>
@@ -4043,17 +5312,17 @@
                 <a:latin typeface="Arial" panose="020B0604020202020204" pitchFamily="34" charset="0"/>
                 <a:cs typeface="Arial" panose="020B0604020202020204" pitchFamily="34" charset="0"/>
               </a:rPr>
-              <a:t>Sep 01</a:t>
-            </a:r>
-          </a:p>
-        </p:txBody>
-      </p:sp>
-      <p:sp>
-        <p:nvSpPr>
-          <p:cNvPr id="22" name="TextBox 21">
+              <a:t>Oct 01</a:t>
+            </a:r>
+          </a:p>
+        </p:txBody>
+      </p:sp>
+      <p:sp>
+        <p:nvSpPr>
+          <p:cNvPr id="21" name="TextBox 20">
             <a:extLst>
               <a:ext uri="{FF2B5EF4-FFF2-40B4-BE49-F238E27FC236}">
-                <a16:creationId xmlns:a16="http://schemas.microsoft.com/office/drawing/2014/main" id="{6DFADEA5-DCA8-FBFF-3A74-7B99024049B4}"/>
+                <a16:creationId xmlns:a16="http://schemas.microsoft.com/office/drawing/2014/main" id="{FB34953A-C176-78D7-2878-539DF88FEF96}"/>
               </a:ext>
             </a:extLst>
           </p:cNvPr>
@@ -4062,8 +5331,8 @@
         </p:nvSpPr>
         <p:spPr>
           <a:xfrm rot="19357041">
-            <a:off x="2200482" y="2742267"/>
-            <a:ext cx="670376" cy="276999"/>
+            <a:off x="5694294" y="8812754"/>
+            <a:ext cx="638316" cy="276999"/>
           </a:xfrm>
           <a:prstGeom prst="rect">
             <a:avLst/>
@@ -4081,17 +5350,17 @@
                 <a:latin typeface="Arial" panose="020B0604020202020204" pitchFamily="34" charset="0"/>
                 <a:cs typeface="Arial" panose="020B0604020202020204" pitchFamily="34" charset="0"/>
               </a:rPr>
-              <a:t>Sep 15</a:t>
-            </a:r>
-          </a:p>
-        </p:txBody>
-      </p:sp>
-      <p:sp>
-        <p:nvSpPr>
-          <p:cNvPr id="23" name="TextBox 22">
+              <a:t>Oct 15</a:t>
+            </a:r>
+          </a:p>
+        </p:txBody>
+      </p:sp>
+      <p:sp>
+        <p:nvSpPr>
+          <p:cNvPr id="22" name="TextBox 21">
             <a:extLst>
               <a:ext uri="{FF2B5EF4-FFF2-40B4-BE49-F238E27FC236}">
-                <a16:creationId xmlns:a16="http://schemas.microsoft.com/office/drawing/2014/main" id="{53C0C0E7-48C5-19BB-DE66-14F0D56C578D}"/>
+                <a16:creationId xmlns:a16="http://schemas.microsoft.com/office/drawing/2014/main" id="{ACCBC3E1-BA13-8284-F272-98917481E2F5}"/>
               </a:ext>
             </a:extLst>
           </p:cNvPr>
@@ -4100,8 +5369,8 @@
         </p:nvSpPr>
         <p:spPr>
           <a:xfrm rot="19357041">
-            <a:off x="4061078" y="2732533"/>
-            <a:ext cx="638316" cy="276999"/>
+            <a:off x="7659464" y="8822488"/>
+            <a:ext cx="670376" cy="276999"/>
           </a:xfrm>
           <a:prstGeom prst="rect">
             <a:avLst/>
@@ -4119,17 +5388,17 @@
                 <a:latin typeface="Arial" panose="020B0604020202020204" pitchFamily="34" charset="0"/>
                 <a:cs typeface="Arial" panose="020B0604020202020204" pitchFamily="34" charset="0"/>
               </a:rPr>
-              <a:t>Oct 01</a:t>
-            </a:r>
-          </a:p>
-        </p:txBody>
-      </p:sp>
-      <p:sp>
-        <p:nvSpPr>
-          <p:cNvPr id="24" name="TextBox 23">
+              <a:t>Nov 01</a:t>
+            </a:r>
+          </a:p>
+        </p:txBody>
+      </p:sp>
+      <p:sp>
+        <p:nvSpPr>
+          <p:cNvPr id="23" name="TextBox 22">
             <a:extLst>
               <a:ext uri="{FF2B5EF4-FFF2-40B4-BE49-F238E27FC236}">
-                <a16:creationId xmlns:a16="http://schemas.microsoft.com/office/drawing/2014/main" id="{28C4767C-1580-63E4-2352-4C54F65992DA}"/>
+                <a16:creationId xmlns:a16="http://schemas.microsoft.com/office/drawing/2014/main" id="{F7B6D96D-FC86-3CCD-513A-7C302F159878}"/>
               </a:ext>
             </a:extLst>
           </p:cNvPr>
@@ -4137,9 +5406,9 @@
           <p:nvPr/>
         </p:nvSpPr>
         <p:spPr>
-          <a:xfrm rot="19357041">
-            <a:off x="5674416" y="2732533"/>
-            <a:ext cx="638316" cy="276999"/>
+          <a:xfrm>
+            <a:off x="754460" y="6291658"/>
+            <a:ext cx="425116" cy="338554"/>
           </a:xfrm>
           <a:prstGeom prst="rect">
             <a:avLst/>
@@ -4153,21 +5422,21 @@
           <a:lstStyle/>
           <a:p>
             <a:r>
-              <a:rPr lang="en-GB" sz="1200" dirty="0">
+              <a:rPr lang="en-GB" sz="1600" dirty="0">
                 <a:latin typeface="Arial" panose="020B0604020202020204" pitchFamily="34" charset="0"/>
                 <a:cs typeface="Arial" panose="020B0604020202020204" pitchFamily="34" charset="0"/>
               </a:rPr>
-              <a:t>Oct 15</a:t>
-            </a:r>
-          </a:p>
-        </p:txBody>
-      </p:sp>
-      <p:sp>
-        <p:nvSpPr>
-          <p:cNvPr id="25" name="TextBox 24">
+              <a:t>(c)</a:t>
+            </a:r>
+          </a:p>
+        </p:txBody>
+      </p:sp>
+      <p:sp>
+        <p:nvSpPr>
+          <p:cNvPr id="24" name="TextBox 23">
             <a:extLst>
               <a:ext uri="{FF2B5EF4-FFF2-40B4-BE49-F238E27FC236}">
-                <a16:creationId xmlns:a16="http://schemas.microsoft.com/office/drawing/2014/main" id="{EDD7A371-A95A-762F-4C34-9F06B747EEC0}"/>
+                <a16:creationId xmlns:a16="http://schemas.microsoft.com/office/drawing/2014/main" id="{F4807224-205A-6D20-460B-F73FF9B1E2A5}"/>
               </a:ext>
             </a:extLst>
           </p:cNvPr>
@@ -4175,9 +5444,9 @@
           <p:nvPr/>
         </p:nvSpPr>
         <p:spPr>
-          <a:xfrm rot="19357041">
-            <a:off x="7639586" y="2742267"/>
-            <a:ext cx="670376" cy="276999"/>
+          <a:xfrm>
+            <a:off x="754460" y="9269746"/>
+            <a:ext cx="436338" cy="338554"/>
           </a:xfrm>
           <a:prstGeom prst="rect">
             <a:avLst/>
@@ -4191,21 +5460,21 @@
           <a:lstStyle/>
           <a:p>
             <a:r>
-              <a:rPr lang="en-GB" sz="1200" dirty="0">
+              <a:rPr lang="en-GB" sz="1600" dirty="0">
                 <a:latin typeface="Arial" panose="020B0604020202020204" pitchFamily="34" charset="0"/>
                 <a:cs typeface="Arial" panose="020B0604020202020204" pitchFamily="34" charset="0"/>
               </a:rPr>
-              <a:t>Nov 01</a:t>
-            </a:r>
-          </a:p>
-        </p:txBody>
-      </p:sp>
-      <p:sp>
-        <p:nvSpPr>
-          <p:cNvPr id="26" name="TextBox 25">
+              <a:t>(d)</a:t>
+            </a:r>
+          </a:p>
+        </p:txBody>
+      </p:sp>
+      <p:sp>
+        <p:nvSpPr>
+          <p:cNvPr id="25" name="TextBox 24">
             <a:extLst>
               <a:ext uri="{FF2B5EF4-FFF2-40B4-BE49-F238E27FC236}">
-                <a16:creationId xmlns:a16="http://schemas.microsoft.com/office/drawing/2014/main" id="{60FD3FE7-F08C-9F49-0957-A7409E5C021F}"/>
+                <a16:creationId xmlns:a16="http://schemas.microsoft.com/office/drawing/2014/main" id="{8F0FD01F-EE73-C642-D88B-46B493F55F0B}"/>
               </a:ext>
             </a:extLst>
           </p:cNvPr>
@@ -4214,8 +5483,8 @@
         </p:nvSpPr>
         <p:spPr>
           <a:xfrm>
-            <a:off x="1067387" y="4070351"/>
-            <a:ext cx="654346" cy="276999"/>
+            <a:off x="1046273" y="6281863"/>
+            <a:ext cx="1915909" cy="369332"/>
           </a:xfrm>
           <a:prstGeom prst="rect">
             <a:avLst/>
@@ -4229,21 +5498,21 @@
           <a:lstStyle/>
           <a:p>
             <a:r>
-              <a:rPr lang="en-GB" sz="1200" b="1" dirty="0">
+              <a:rPr lang="en-JP" b="1" dirty="0">
                 <a:latin typeface="Arial" panose="020B0604020202020204" pitchFamily="34" charset="0"/>
                 <a:cs typeface="Arial" panose="020B0604020202020204" pitchFamily="34" charset="0"/>
               </a:rPr>
-              <a:t>Forest</a:t>
-            </a:r>
-          </a:p>
-        </p:txBody>
-      </p:sp>
-      <p:sp>
-        <p:nvSpPr>
-          <p:cNvPr id="27" name="TextBox 26">
+              <a:t>Anthropophony</a:t>
+            </a:r>
+          </a:p>
+        </p:txBody>
+      </p:sp>
+      <p:sp>
+        <p:nvSpPr>
+          <p:cNvPr id="26" name="TextBox 25">
             <a:extLst>
               <a:ext uri="{FF2B5EF4-FFF2-40B4-BE49-F238E27FC236}">
-                <a16:creationId xmlns:a16="http://schemas.microsoft.com/office/drawing/2014/main" id="{B05C7AC1-B71C-0F22-6088-F6475EA39DC5}"/>
+                <a16:creationId xmlns:a16="http://schemas.microsoft.com/office/drawing/2014/main" id="{CD00E368-1FAB-2434-F863-6102E1410856}"/>
               </a:ext>
             </a:extLst>
           </p:cNvPr>
@@ -4252,8 +5521,8 @@
         </p:nvSpPr>
         <p:spPr>
           <a:xfrm>
-            <a:off x="1067387" y="5215578"/>
-            <a:ext cx="962123" cy="276999"/>
+            <a:off x="1046271" y="182311"/>
+            <a:ext cx="1249060" cy="369332"/>
           </a:xfrm>
           <a:prstGeom prst="rect">
             <a:avLst/>
@@ -4267,315 +5536,11 @@
           <a:lstStyle/>
           <a:p>
             <a:r>
-              <a:rPr lang="en-GB" sz="1200" b="1" dirty="0">
+              <a:rPr lang="en-JP" b="1" dirty="0">
                 <a:latin typeface="Arial" panose="020B0604020202020204" pitchFamily="34" charset="0"/>
                 <a:cs typeface="Arial" panose="020B0604020202020204" pitchFamily="34" charset="0"/>
               </a:rPr>
-              <a:t>Developed</a:t>
-            </a:r>
-          </a:p>
-        </p:txBody>
-      </p:sp>
-      <p:sp>
-        <p:nvSpPr>
-          <p:cNvPr id="28" name="TextBox 27">
-            <a:extLst>
-              <a:ext uri="{FF2B5EF4-FFF2-40B4-BE49-F238E27FC236}">
-                <a16:creationId xmlns:a16="http://schemas.microsoft.com/office/drawing/2014/main" id="{008BD4EE-C749-6853-01AD-973DF5F3CC74}"/>
-              </a:ext>
-            </a:extLst>
-          </p:cNvPr>
-          <p:cNvSpPr txBox="1"/>
-          <p:nvPr/>
-        </p:nvSpPr>
-        <p:spPr>
-          <a:xfrm>
-            <a:off x="714704" y="201502"/>
-            <a:ext cx="436338" cy="338554"/>
-          </a:xfrm>
-          <a:prstGeom prst="rect">
-            <a:avLst/>
-          </a:prstGeom>
-          <a:noFill/>
-        </p:spPr>
-        <p:txBody>
-          <a:bodyPr wrap="none" rtlCol="0">
-            <a:spAutoFit/>
-          </a:bodyPr>
-          <a:lstStyle/>
-          <a:p>
-            <a:r>
-              <a:rPr lang="en-GB" sz="1600" dirty="0">
-                <a:latin typeface="Arial" panose="020B0604020202020204" pitchFamily="34" charset="0"/>
-                <a:cs typeface="Arial" panose="020B0604020202020204" pitchFamily="34" charset="0"/>
-              </a:rPr>
-              <a:t>(a)</a:t>
-            </a:r>
-          </a:p>
-        </p:txBody>
-      </p:sp>
-      <p:sp>
-        <p:nvSpPr>
-          <p:cNvPr id="29" name="TextBox 28">
-            <a:extLst>
-              <a:ext uri="{FF2B5EF4-FFF2-40B4-BE49-F238E27FC236}">
-                <a16:creationId xmlns:a16="http://schemas.microsoft.com/office/drawing/2014/main" id="{29D3A6E0-654E-1D6C-65AF-82E0D688B6F6}"/>
-              </a:ext>
-            </a:extLst>
-          </p:cNvPr>
-          <p:cNvSpPr txBox="1"/>
-          <p:nvPr/>
-        </p:nvSpPr>
-        <p:spPr>
-          <a:xfrm>
-            <a:off x="714704" y="3259102"/>
-            <a:ext cx="436338" cy="338554"/>
-          </a:xfrm>
-          <a:prstGeom prst="rect">
-            <a:avLst/>
-          </a:prstGeom>
-          <a:noFill/>
-        </p:spPr>
-        <p:txBody>
-          <a:bodyPr wrap="none" rtlCol="0">
-            <a:spAutoFit/>
-          </a:bodyPr>
-          <a:lstStyle/>
-          <a:p>
-            <a:r>
-              <a:rPr lang="en-GB" sz="1600" dirty="0">
-                <a:latin typeface="Arial" panose="020B0604020202020204" pitchFamily="34" charset="0"/>
-                <a:cs typeface="Arial" panose="020B0604020202020204" pitchFamily="34" charset="0"/>
-              </a:rPr>
-              <a:t>(b)</a:t>
-            </a:r>
-          </a:p>
-        </p:txBody>
-      </p:sp>
-      <p:sp>
-        <p:nvSpPr>
-          <p:cNvPr id="30" name="TextBox 29">
-            <a:extLst>
-              <a:ext uri="{FF2B5EF4-FFF2-40B4-BE49-F238E27FC236}">
-                <a16:creationId xmlns:a16="http://schemas.microsoft.com/office/drawing/2014/main" id="{25959602-E34C-AAF9-D984-F367C4BB1184}"/>
-              </a:ext>
-            </a:extLst>
-          </p:cNvPr>
-          <p:cNvSpPr txBox="1"/>
-          <p:nvPr/>
-        </p:nvSpPr>
-        <p:spPr>
-          <a:xfrm>
-            <a:off x="9937332" y="1498427"/>
-            <a:ext cx="298480" cy="338554"/>
-          </a:xfrm>
-          <a:prstGeom prst="rect">
-            <a:avLst/>
-          </a:prstGeom>
-          <a:noFill/>
-        </p:spPr>
-        <p:txBody>
-          <a:bodyPr wrap="none" rtlCol="0">
-            <a:spAutoFit/>
-          </a:bodyPr>
-          <a:lstStyle/>
-          <a:p>
-            <a:r>
-              <a:rPr lang="en-GB" sz="1600" dirty="0">
-                <a:latin typeface="Arial" panose="020B0604020202020204" pitchFamily="34" charset="0"/>
-                <a:cs typeface="Arial" panose="020B0604020202020204" pitchFamily="34" charset="0"/>
-              </a:rPr>
-              <a:t>a</a:t>
-            </a:r>
-          </a:p>
-        </p:txBody>
-      </p:sp>
-      <p:sp>
-        <p:nvSpPr>
-          <p:cNvPr id="31" name="TextBox 30">
-            <a:extLst>
-              <a:ext uri="{FF2B5EF4-FFF2-40B4-BE49-F238E27FC236}">
-                <a16:creationId xmlns:a16="http://schemas.microsoft.com/office/drawing/2014/main" id="{E6370053-AE09-10EF-9295-812B864A91DF}"/>
-              </a:ext>
-            </a:extLst>
-          </p:cNvPr>
-          <p:cNvSpPr txBox="1"/>
-          <p:nvPr/>
-        </p:nvSpPr>
-        <p:spPr>
-          <a:xfrm>
-            <a:off x="11150634" y="168692"/>
-            <a:ext cx="298480" cy="338554"/>
-          </a:xfrm>
-          <a:prstGeom prst="rect">
-            <a:avLst/>
-          </a:prstGeom>
-          <a:noFill/>
-        </p:spPr>
-        <p:txBody>
-          <a:bodyPr wrap="none" rtlCol="0">
-            <a:spAutoFit/>
-          </a:bodyPr>
-          <a:lstStyle/>
-          <a:p>
-            <a:r>
-              <a:rPr lang="en-GB" sz="1600" dirty="0">
-                <a:latin typeface="Arial" panose="020B0604020202020204" pitchFamily="34" charset="0"/>
-                <a:cs typeface="Arial" panose="020B0604020202020204" pitchFamily="34" charset="0"/>
-              </a:rPr>
-              <a:t>b</a:t>
-            </a:r>
-          </a:p>
-        </p:txBody>
-      </p:sp>
-      <p:sp>
-        <p:nvSpPr>
-          <p:cNvPr id="32" name="TextBox 31">
-            <a:extLst>
-              <a:ext uri="{FF2B5EF4-FFF2-40B4-BE49-F238E27FC236}">
-                <a16:creationId xmlns:a16="http://schemas.microsoft.com/office/drawing/2014/main" id="{D9A8663B-4634-72DD-1FB0-FE3DAE298A94}"/>
-              </a:ext>
-            </a:extLst>
-          </p:cNvPr>
-          <p:cNvSpPr txBox="1"/>
-          <p:nvPr/>
-        </p:nvSpPr>
-        <p:spPr>
-          <a:xfrm>
-            <a:off x="9726523" y="3911582"/>
-            <a:ext cx="298480" cy="338554"/>
-          </a:xfrm>
-          <a:prstGeom prst="rect">
-            <a:avLst/>
-          </a:prstGeom>
-          <a:noFill/>
-        </p:spPr>
-        <p:txBody>
-          <a:bodyPr wrap="none" rtlCol="0">
-            <a:spAutoFit/>
-          </a:bodyPr>
-          <a:lstStyle/>
-          <a:p>
-            <a:r>
-              <a:rPr lang="en-GB" sz="1600" dirty="0">
-                <a:latin typeface="Arial" panose="020B0604020202020204" pitchFamily="34" charset="0"/>
-                <a:cs typeface="Arial" panose="020B0604020202020204" pitchFamily="34" charset="0"/>
-              </a:rPr>
-              <a:t>a</a:t>
-            </a:r>
-          </a:p>
-        </p:txBody>
-      </p:sp>
-      <p:sp>
-        <p:nvSpPr>
-          <p:cNvPr id="33" name="TextBox 32">
-            <a:extLst>
-              <a:ext uri="{FF2B5EF4-FFF2-40B4-BE49-F238E27FC236}">
-                <a16:creationId xmlns:a16="http://schemas.microsoft.com/office/drawing/2014/main" id="{47737F4E-C756-C1F1-24F2-CD59E725CA48}"/>
-              </a:ext>
-            </a:extLst>
-          </p:cNvPr>
-          <p:cNvSpPr txBox="1"/>
-          <p:nvPr/>
-        </p:nvSpPr>
-        <p:spPr>
-          <a:xfrm>
-            <a:off x="10083283" y="3175140"/>
-            <a:ext cx="298480" cy="338554"/>
-          </a:xfrm>
-          <a:prstGeom prst="rect">
-            <a:avLst/>
-          </a:prstGeom>
-          <a:noFill/>
-        </p:spPr>
-        <p:txBody>
-          <a:bodyPr wrap="none" rtlCol="0">
-            <a:spAutoFit/>
-          </a:bodyPr>
-          <a:lstStyle/>
-          <a:p>
-            <a:r>
-              <a:rPr lang="en-GB" sz="1600" dirty="0">
-                <a:latin typeface="Arial" panose="020B0604020202020204" pitchFamily="34" charset="0"/>
-                <a:cs typeface="Arial" panose="020B0604020202020204" pitchFamily="34" charset="0"/>
-              </a:rPr>
-              <a:t>b</a:t>
-            </a:r>
-          </a:p>
-        </p:txBody>
-      </p:sp>
-      <p:sp>
-        <p:nvSpPr>
-          <p:cNvPr id="34" name="TextBox 33">
-            <a:extLst>
-              <a:ext uri="{FF2B5EF4-FFF2-40B4-BE49-F238E27FC236}">
-                <a16:creationId xmlns:a16="http://schemas.microsoft.com/office/drawing/2014/main" id="{649A1BBE-13EC-8A7A-EF46-06D9F157C5C2}"/>
-              </a:ext>
-            </a:extLst>
-          </p:cNvPr>
-          <p:cNvSpPr txBox="1"/>
-          <p:nvPr/>
-        </p:nvSpPr>
-        <p:spPr>
-          <a:xfrm>
-            <a:off x="10933335" y="4489834"/>
-            <a:ext cx="298480" cy="338554"/>
-          </a:xfrm>
-          <a:prstGeom prst="rect">
-            <a:avLst/>
-          </a:prstGeom>
-          <a:noFill/>
-        </p:spPr>
-        <p:txBody>
-          <a:bodyPr wrap="none" rtlCol="0">
-            <a:spAutoFit/>
-          </a:bodyPr>
-          <a:lstStyle/>
-          <a:p>
-            <a:r>
-              <a:rPr lang="en-GB" sz="1600" dirty="0">
-                <a:latin typeface="Arial" panose="020B0604020202020204" pitchFamily="34" charset="0"/>
-                <a:cs typeface="Arial" panose="020B0604020202020204" pitchFamily="34" charset="0"/>
-              </a:rPr>
-              <a:t>c</a:t>
-            </a:r>
-          </a:p>
-        </p:txBody>
-      </p:sp>
-      <p:sp>
-        <p:nvSpPr>
-          <p:cNvPr id="35" name="TextBox 34">
-            <a:extLst>
-              <a:ext uri="{FF2B5EF4-FFF2-40B4-BE49-F238E27FC236}">
-                <a16:creationId xmlns:a16="http://schemas.microsoft.com/office/drawing/2014/main" id="{AB438236-282F-86B5-B17D-1D1E1978DF3E}"/>
-              </a:ext>
-            </a:extLst>
-          </p:cNvPr>
-          <p:cNvSpPr txBox="1"/>
-          <p:nvPr/>
-        </p:nvSpPr>
-        <p:spPr>
-          <a:xfrm>
-            <a:off x="11367580" y="4134255"/>
-            <a:ext cx="401072" cy="338554"/>
-          </a:xfrm>
-          <a:prstGeom prst="rect">
-            <a:avLst/>
-          </a:prstGeom>
-          <a:noFill/>
-        </p:spPr>
-        <p:txBody>
-          <a:bodyPr wrap="none" rtlCol="0">
-            <a:spAutoFit/>
-          </a:bodyPr>
-          <a:lstStyle/>
-          <a:p>
-            <a:r>
-              <a:rPr lang="en-GB" sz="1600" dirty="0">
-                <a:latin typeface="Arial" panose="020B0604020202020204" pitchFamily="34" charset="0"/>
-                <a:cs typeface="Arial" panose="020B0604020202020204" pitchFamily="34" charset="0"/>
-              </a:rPr>
-              <a:t>ac</a:t>
+              <a:t>Biophony</a:t>
             </a:r>
           </a:p>
         </p:txBody>
@@ -4583,7 +5548,7 @@
     </p:spTree>
     <p:extLst>
       <p:ext uri="{BB962C8B-B14F-4D97-AF65-F5344CB8AC3E}">
-        <p14:creationId xmlns:p14="http://schemas.microsoft.com/office/powerpoint/2010/main" val="1887293638"/>
+        <p14:creationId xmlns:p14="http://schemas.microsoft.com/office/powerpoint/2010/main" val="695277341"/>
       </p:ext>
     </p:extLst>
   </p:cSld>

</xml_diff>